<commit_message>
Moved voicing utils to separate utils file
</commit_message>
<xml_diff>
--- a/TabMaker_compact.pptx
+++ b/TabMaker_compact.pptx
@@ -5,7 +5,7 @@
     <p:sldMasterId id="2147483700" r:id="rId1"/>
   </p:sldMasterIdLst>
   <p:notesMasterIdLst>
-    <p:notesMasterId r:id="rId14"/>
+    <p:notesMasterId r:id="rId15"/>
   </p:notesMasterIdLst>
   <p:sldIdLst>
     <p:sldId id="256" r:id="rId2"/>
@@ -14,12 +14,13 @@
     <p:sldId id="270" r:id="rId5"/>
     <p:sldId id="273" r:id="rId6"/>
     <p:sldId id="281" r:id="rId7"/>
-    <p:sldId id="278" r:id="rId8"/>
-    <p:sldId id="261" r:id="rId9"/>
-    <p:sldId id="260" r:id="rId10"/>
-    <p:sldId id="274" r:id="rId11"/>
-    <p:sldId id="275" r:id="rId12"/>
-    <p:sldId id="276" r:id="rId13"/>
+    <p:sldId id="282" r:id="rId8"/>
+    <p:sldId id="278" r:id="rId9"/>
+    <p:sldId id="261" r:id="rId10"/>
+    <p:sldId id="260" r:id="rId11"/>
+    <p:sldId id="274" r:id="rId12"/>
+    <p:sldId id="275" r:id="rId13"/>
+    <p:sldId id="276" r:id="rId14"/>
   </p:sldIdLst>
   <p:sldSz cx="12192000" cy="6858000"/>
   <p:notesSz cx="6858000" cy="9144000"/>
@@ -10572,7 +10573,7 @@
           <a:p>
             <a:fld id="{B9177E53-FA8F-42AF-9113-372B0C83F087}" type="slidenum">
               <a:rPr lang="it-IT" smtClean="0"/>
-              <a:t>11</a:t>
+              <a:t>12</a:t>
             </a:fld>
             <a:endParaRPr lang="it-IT"/>
           </a:p>
@@ -11717,7 +11718,7 @@
           <a:p>
             <a:fld id="{B9177E53-FA8F-42AF-9113-372B0C83F087}" type="slidenum">
               <a:rPr lang="it-IT" smtClean="0"/>
-              <a:t>12</a:t>
+              <a:t>13</a:t>
             </a:fld>
             <a:endParaRPr lang="it-IT"/>
           </a:p>
@@ -14550,7 +14551,7 @@
           <a:p>
             <a:fld id="{B9177E53-FA8F-42AF-9113-372B0C83F087}" type="slidenum">
               <a:rPr lang="it-IT" smtClean="0"/>
-              <a:t>7</a:t>
+              <a:t>8</a:t>
             </a:fld>
             <a:endParaRPr lang="it-IT"/>
           </a:p>
@@ -15215,7 +15216,7 @@
           <a:p>
             <a:fld id="{B9177E53-FA8F-42AF-9113-372B0C83F087}" type="slidenum">
               <a:rPr lang="it-IT" smtClean="0"/>
-              <a:t>8</a:t>
+              <a:t>9</a:t>
             </a:fld>
             <a:endParaRPr lang="it-IT"/>
           </a:p>
@@ -16481,7 +16482,7 @@
           <a:p>
             <a:fld id="{B9177E53-FA8F-42AF-9113-372B0C83F087}" type="slidenum">
               <a:rPr lang="it-IT" smtClean="0"/>
-              <a:t>9</a:t>
+              <a:t>10</a:t>
             </a:fld>
             <a:endParaRPr lang="it-IT"/>
           </a:p>
@@ -17438,7 +17439,7 @@
           <a:p>
             <a:fld id="{B9177E53-FA8F-42AF-9113-372B0C83F087}" type="slidenum">
               <a:rPr lang="it-IT" smtClean="0"/>
-              <a:t>10</a:t>
+              <a:t>11</a:t>
             </a:fld>
             <a:endParaRPr lang="it-IT"/>
           </a:p>
@@ -23828,6 +23829,1457 @@
   <p:cSld>
     <p:bg>
       <p:bgPr>
+        <a:blipFill rotWithShape="1">
+          <a:blip r:embed="rId3">
+            <a:duotone>
+              <a:schemeClr val="bg2">
+                <a:shade val="69000"/>
+                <a:hueMod val="108000"/>
+                <a:satMod val="164000"/>
+                <a:lumMod val="74000"/>
+              </a:schemeClr>
+              <a:schemeClr val="bg2">
+                <a:tint val="96000"/>
+                <a:hueMod val="88000"/>
+                <a:satMod val="140000"/>
+                <a:lumMod val="132000"/>
+              </a:schemeClr>
+            </a:duotone>
+          </a:blip>
+          <a:stretch/>
+        </a:blipFill>
+        <a:effectLst/>
+      </p:bgPr>
+    </p:bg>
+    <p:spTree>
+      <p:nvGrpSpPr>
+        <p:cNvPr id="1" name=""/>
+        <p:cNvGrpSpPr/>
+        <p:nvPr/>
+      </p:nvGrpSpPr>
+      <p:grpSpPr>
+        <a:xfrm>
+          <a:off x="0" y="0"/>
+          <a:ext cx="0" cy="0"/>
+          <a:chOff x="0" y="0"/>
+          <a:chExt cx="0" cy="0"/>
+        </a:xfrm>
+      </p:grpSpPr>
+      <p:sp>
+        <p:nvSpPr>
+          <p:cNvPr id="1033" name="Rectangle 1032">
+            <a:extLst>
+              <a:ext uri="{FF2B5EF4-FFF2-40B4-BE49-F238E27FC236}">
+                <a16:creationId xmlns:a16="http://schemas.microsoft.com/office/drawing/2014/main" id="{C8A3C342-1D03-412F-8DD3-BF519E8E0AE9}"/>
+              </a:ext>
+              <a:ext uri="{C183D7F6-B498-43B3-948B-1728B52AA6E4}">
+                <adec:decorative xmlns:adec="http://schemas.microsoft.com/office/drawing/2017/decorative" val="1"/>
+              </a:ext>
+            </a:extLst>
+          </p:cNvPr>
+          <p:cNvSpPr>
+            <a:spLocks noGrp="1" noRot="1" noChangeAspect="1" noMove="1" noResize="1" noEditPoints="1" noAdjustHandles="1" noChangeArrowheads="1" noChangeShapeType="1" noTextEdit="1"/>
+          </p:cNvSpPr>
+          <p:nvPr>
+            <p:extLst>
+              <p:ext uri="{386F3935-93C4-4BCD-93E2-E3B085C9AB24}">
+                <p16:designElem xmlns:p16="http://schemas.microsoft.com/office/powerpoint/2015/main" val="1"/>
+              </p:ext>
+            </p:extLst>
+          </p:nvPr>
+        </p:nvSpPr>
+        <p:spPr>
+          <a:xfrm>
+            <a:off x="0" y="0"/>
+            <a:ext cx="12192000" cy="6858000"/>
+          </a:xfrm>
+          <a:prstGeom prst="rect">
+            <a:avLst/>
+          </a:prstGeom>
+          <a:ln>
+            <a:noFill/>
+          </a:ln>
+        </p:spPr>
+        <p:style>
+          <a:lnRef idx="2">
+            <a:schemeClr val="accent1">
+              <a:shade val="50000"/>
+            </a:schemeClr>
+          </a:lnRef>
+          <a:fillRef idx="1003">
+            <a:schemeClr val="dk2"/>
+          </a:fillRef>
+          <a:effectRef idx="0">
+            <a:schemeClr val="accent1"/>
+          </a:effectRef>
+          <a:fontRef idx="minor">
+            <a:schemeClr val="lt1"/>
+          </a:fontRef>
+        </p:style>
+        <p:txBody>
+          <a:bodyPr rtlCol="0" anchor="ctr"/>
+          <a:lstStyle/>
+          <a:p>
+            <a:pPr marL="0" marR="0" lvl="0" indent="0" algn="ctr" defTabSz="914400" rtl="0" eaLnBrk="1" fontAlgn="auto" latinLnBrk="0" hangingPunct="1">
+              <a:lnSpc>
+                <a:spcPct val="100000"/>
+              </a:lnSpc>
+              <a:spcBef>
+                <a:spcPts val="0"/>
+              </a:spcBef>
+              <a:spcAft>
+                <a:spcPts val="0"/>
+              </a:spcAft>
+              <a:buClrTx/>
+              <a:buSzTx/>
+              <a:buFontTx/>
+              <a:buNone/>
+              <a:tabLst/>
+              <a:defRPr/>
+            </a:pPr>
+            <a:endParaRPr kumimoji="0" lang="en-US" sz="1800" b="0" i="0" u="none" strike="noStrike" kern="1200" cap="none" spc="0" normalizeH="0" baseline="0" noProof="0">
+              <a:ln>
+                <a:noFill/>
+              </a:ln>
+              <a:solidFill>
+                <a:prstClr val="white"/>
+              </a:solidFill>
+              <a:effectLst/>
+              <a:uLnTx/>
+              <a:uFillTx/>
+              <a:latin typeface="Century Gothic" panose="020B0502020202020204"/>
+              <a:ea typeface="+mn-ea"/>
+              <a:cs typeface="+mn-cs"/>
+            </a:endParaRPr>
+          </a:p>
+        </p:txBody>
+      </p:sp>
+      <p:sp>
+        <p:nvSpPr>
+          <p:cNvPr id="2" name="Titolo 1">
+            <a:extLst>
+              <a:ext uri="{FF2B5EF4-FFF2-40B4-BE49-F238E27FC236}">
+                <a16:creationId xmlns:a16="http://schemas.microsoft.com/office/drawing/2014/main" id="{E24CF92A-E7B9-76DA-23C0-51A0B6EB071A}"/>
+              </a:ext>
+            </a:extLst>
+          </p:cNvPr>
+          <p:cNvSpPr>
+            <a:spLocks noGrp="1"/>
+          </p:cNvSpPr>
+          <p:nvPr>
+            <p:ph type="title"/>
+          </p:nvPr>
+        </p:nvSpPr>
+        <p:spPr>
+          <a:xfrm>
+            <a:off x="648930" y="629266"/>
+            <a:ext cx="6188190" cy="1622321"/>
+          </a:xfrm>
+        </p:spPr>
+        <p:txBody>
+          <a:bodyPr>
+            <a:normAutofit/>
+          </a:bodyPr>
+          <a:lstStyle/>
+          <a:p>
+            <a:r>
+              <a:rPr lang="it-IT">
+                <a:solidFill>
+                  <a:srgbClr val="EBEBEB"/>
+                </a:solidFill>
+              </a:rPr>
+              <a:t>FEASIBILITY CONSTRAINTS</a:t>
+            </a:r>
+          </a:p>
+        </p:txBody>
+      </p:sp>
+      <p:sp>
+        <p:nvSpPr>
+          <p:cNvPr id="1035" name="Freeform 31">
+            <a:extLst>
+              <a:ext uri="{FF2B5EF4-FFF2-40B4-BE49-F238E27FC236}">
+                <a16:creationId xmlns:a16="http://schemas.microsoft.com/office/drawing/2014/main" id="{81CC9B02-E087-4350-AEBD-2C3CF001AF01}"/>
+              </a:ext>
+              <a:ext uri="{C183D7F6-B498-43B3-948B-1728B52AA6E4}">
+                <adec:decorative xmlns:adec="http://schemas.microsoft.com/office/drawing/2017/decorative" val="1"/>
+              </a:ext>
+            </a:extLst>
+          </p:cNvPr>
+          <p:cNvSpPr>
+            <a:spLocks noGrp="1" noRot="1" noChangeAspect="1" noMove="1" noResize="1" noEditPoints="1" noAdjustHandles="1" noChangeArrowheads="1" noChangeShapeType="1" noTextEdit="1"/>
+          </p:cNvSpPr>
+          <p:nvPr>
+            <p:extLst>
+              <p:ext uri="{386F3935-93C4-4BCD-93E2-E3B085C9AB24}">
+                <p16:designElem xmlns:p16="http://schemas.microsoft.com/office/powerpoint/2015/main" val="1"/>
+              </p:ext>
+            </p:extLst>
+          </p:nvPr>
+        </p:nvSpPr>
+        <p:spPr>
+          <a:xfrm>
+            <a:off x="7015974" y="-1"/>
+            <a:ext cx="559472" cy="3709642"/>
+          </a:xfrm>
+          <a:custGeom>
+            <a:avLst/>
+            <a:gdLst>
+              <a:gd name="connsiteX0" fmla="*/ 0 w 559472"/>
+              <a:gd name="connsiteY0" fmla="*/ 0 h 3709642"/>
+              <a:gd name="connsiteX1" fmla="*/ 473952 w 559472"/>
+              <a:gd name="connsiteY1" fmla="*/ 0 h 3709642"/>
+              <a:gd name="connsiteX2" fmla="*/ 485840 w 559472"/>
+              <a:gd name="connsiteY2" fmla="*/ 161194 h 3709642"/>
+              <a:gd name="connsiteX3" fmla="*/ 523949 w 559472"/>
+              <a:gd name="connsiteY3" fmla="*/ 3672197 h 3709642"/>
+              <a:gd name="connsiteX4" fmla="*/ 454748 w 559472"/>
+              <a:gd name="connsiteY4" fmla="*/ 3709642 h 3709642"/>
+              <a:gd name="connsiteX5" fmla="*/ 448224 w 559472"/>
+              <a:gd name="connsiteY5" fmla="*/ 3510471 h 3709642"/>
+              <a:gd name="connsiteX6" fmla="*/ 443564 w 559472"/>
+              <a:gd name="connsiteY6" fmla="*/ 3408563 h 3709642"/>
+              <a:gd name="connsiteX7" fmla="*/ 438902 w 559472"/>
+              <a:gd name="connsiteY7" fmla="*/ 3304407 h 3709642"/>
+              <a:gd name="connsiteX8" fmla="*/ 433941 w 559472"/>
+              <a:gd name="connsiteY8" fmla="*/ 3198777 h 3709642"/>
+              <a:gd name="connsiteX9" fmla="*/ 427584 w 559472"/>
+              <a:gd name="connsiteY9" fmla="*/ 3092510 h 3709642"/>
+              <a:gd name="connsiteX10" fmla="*/ 420988 w 559472"/>
+              <a:gd name="connsiteY10" fmla="*/ 2984390 h 3709642"/>
+              <a:gd name="connsiteX11" fmla="*/ 414330 w 559472"/>
+              <a:gd name="connsiteY11" fmla="*/ 2874401 h 3709642"/>
+              <a:gd name="connsiteX12" fmla="*/ 406840 w 559472"/>
+              <a:gd name="connsiteY12" fmla="*/ 2762980 h 3709642"/>
+              <a:gd name="connsiteX13" fmla="*/ 397745 w 559472"/>
+              <a:gd name="connsiteY13" fmla="*/ 2650566 h 3709642"/>
+              <a:gd name="connsiteX14" fmla="*/ 389154 w 559472"/>
+              <a:gd name="connsiteY14" fmla="*/ 2536612 h 3709642"/>
+              <a:gd name="connsiteX15" fmla="*/ 379225 w 559472"/>
+              <a:gd name="connsiteY15" fmla="*/ 2421642 h 3709642"/>
+              <a:gd name="connsiteX16" fmla="*/ 368316 w 559472"/>
+              <a:gd name="connsiteY16" fmla="*/ 2305627 h 3709642"/>
+              <a:gd name="connsiteX17" fmla="*/ 357466 w 559472"/>
+              <a:gd name="connsiteY17" fmla="*/ 2189233 h 3709642"/>
+              <a:gd name="connsiteX18" fmla="*/ 344982 w 559472"/>
+              <a:gd name="connsiteY18" fmla="*/ 2071473 h 3709642"/>
+              <a:gd name="connsiteX19" fmla="*/ 332466 w 559472"/>
+              <a:gd name="connsiteY19" fmla="*/ 1952216 h 3709642"/>
+              <a:gd name="connsiteX20" fmla="*/ 319121 w 559472"/>
+              <a:gd name="connsiteY20" fmla="*/ 1833776 h 3709642"/>
+              <a:gd name="connsiteX21" fmla="*/ 304408 w 559472"/>
+              <a:gd name="connsiteY21" fmla="*/ 1713948 h 3709642"/>
+              <a:gd name="connsiteX22" fmla="*/ 288685 w 559472"/>
+              <a:gd name="connsiteY22" fmla="*/ 1592703 h 3709642"/>
+              <a:gd name="connsiteX23" fmla="*/ 273050 w 559472"/>
+              <a:gd name="connsiteY23" fmla="*/ 1471451 h 3709642"/>
+              <a:gd name="connsiteX24" fmla="*/ 255813 w 559472"/>
+              <a:gd name="connsiteY24" fmla="*/ 1350328 h 3709642"/>
+              <a:gd name="connsiteX25" fmla="*/ 237060 w 559472"/>
+              <a:gd name="connsiteY25" fmla="*/ 1227080 h 3709642"/>
+              <a:gd name="connsiteX26" fmla="*/ 218488 w 559472"/>
+              <a:gd name="connsiteY26" fmla="*/ 1106065 h 3709642"/>
+              <a:gd name="connsiteX27" fmla="*/ 198221 w 559472"/>
+              <a:gd name="connsiteY27" fmla="*/ 982940 h 3709642"/>
+              <a:gd name="connsiteX28" fmla="*/ 177152 w 559472"/>
+              <a:gd name="connsiteY28" fmla="*/ 858755 h 3709642"/>
+              <a:gd name="connsiteX29" fmla="*/ 155551 w 559472"/>
+              <a:gd name="connsiteY29" fmla="*/ 736861 h 3709642"/>
+              <a:gd name="connsiteX30" fmla="*/ 131782 w 559472"/>
+              <a:gd name="connsiteY30" fmla="*/ 613645 h 3709642"/>
+              <a:gd name="connsiteX31" fmla="*/ 107123 w 559472"/>
+              <a:gd name="connsiteY31" fmla="*/ 490500 h 3709642"/>
+              <a:gd name="connsiteX32" fmla="*/ 82552 w 559472"/>
+              <a:gd name="connsiteY32" fmla="*/ 367348 h 3709642"/>
+              <a:gd name="connsiteX33" fmla="*/ 55608 w 559472"/>
+              <a:gd name="connsiteY33" fmla="*/ 244762 h 3709642"/>
+              <a:gd name="connsiteX34" fmla="*/ 28130 w 559472"/>
+              <a:gd name="connsiteY34" fmla="*/ 122220 h 3709642"/>
+              <a:gd name="connsiteX35" fmla="*/ 0 w 559472"/>
+              <a:gd name="connsiteY35" fmla="*/ 0 h 3709642"/>
+            </a:gdLst>
+            <a:ahLst/>
+            <a:cxnLst>
+              <a:cxn ang="0">
+                <a:pos x="connsiteX0" y="connsiteY0"/>
+              </a:cxn>
+              <a:cxn ang="0">
+                <a:pos x="connsiteX1" y="connsiteY1"/>
+              </a:cxn>
+              <a:cxn ang="0">
+                <a:pos x="connsiteX2" y="connsiteY2"/>
+              </a:cxn>
+              <a:cxn ang="0">
+                <a:pos x="connsiteX3" y="connsiteY3"/>
+              </a:cxn>
+              <a:cxn ang="0">
+                <a:pos x="connsiteX4" y="connsiteY4"/>
+              </a:cxn>
+              <a:cxn ang="0">
+                <a:pos x="connsiteX5" y="connsiteY5"/>
+              </a:cxn>
+              <a:cxn ang="0">
+                <a:pos x="connsiteX6" y="connsiteY6"/>
+              </a:cxn>
+              <a:cxn ang="0">
+                <a:pos x="connsiteX7" y="connsiteY7"/>
+              </a:cxn>
+              <a:cxn ang="0">
+                <a:pos x="connsiteX8" y="connsiteY8"/>
+              </a:cxn>
+              <a:cxn ang="0">
+                <a:pos x="connsiteX9" y="connsiteY9"/>
+              </a:cxn>
+              <a:cxn ang="0">
+                <a:pos x="connsiteX10" y="connsiteY10"/>
+              </a:cxn>
+              <a:cxn ang="0">
+                <a:pos x="connsiteX11" y="connsiteY11"/>
+              </a:cxn>
+              <a:cxn ang="0">
+                <a:pos x="connsiteX12" y="connsiteY12"/>
+              </a:cxn>
+              <a:cxn ang="0">
+                <a:pos x="connsiteX13" y="connsiteY13"/>
+              </a:cxn>
+              <a:cxn ang="0">
+                <a:pos x="connsiteX14" y="connsiteY14"/>
+              </a:cxn>
+              <a:cxn ang="0">
+                <a:pos x="connsiteX15" y="connsiteY15"/>
+              </a:cxn>
+              <a:cxn ang="0">
+                <a:pos x="connsiteX16" y="connsiteY16"/>
+              </a:cxn>
+              <a:cxn ang="0">
+                <a:pos x="connsiteX17" y="connsiteY17"/>
+              </a:cxn>
+              <a:cxn ang="0">
+                <a:pos x="connsiteX18" y="connsiteY18"/>
+              </a:cxn>
+              <a:cxn ang="0">
+                <a:pos x="connsiteX19" y="connsiteY19"/>
+              </a:cxn>
+              <a:cxn ang="0">
+                <a:pos x="connsiteX20" y="connsiteY20"/>
+              </a:cxn>
+              <a:cxn ang="0">
+                <a:pos x="connsiteX21" y="connsiteY21"/>
+              </a:cxn>
+              <a:cxn ang="0">
+                <a:pos x="connsiteX22" y="connsiteY22"/>
+              </a:cxn>
+              <a:cxn ang="0">
+                <a:pos x="connsiteX23" y="connsiteY23"/>
+              </a:cxn>
+              <a:cxn ang="0">
+                <a:pos x="connsiteX24" y="connsiteY24"/>
+              </a:cxn>
+              <a:cxn ang="0">
+                <a:pos x="connsiteX25" y="connsiteY25"/>
+              </a:cxn>
+              <a:cxn ang="0">
+                <a:pos x="connsiteX26" y="connsiteY26"/>
+              </a:cxn>
+              <a:cxn ang="0">
+                <a:pos x="connsiteX27" y="connsiteY27"/>
+              </a:cxn>
+              <a:cxn ang="0">
+                <a:pos x="connsiteX28" y="connsiteY28"/>
+              </a:cxn>
+              <a:cxn ang="0">
+                <a:pos x="connsiteX29" y="connsiteY29"/>
+              </a:cxn>
+              <a:cxn ang="0">
+                <a:pos x="connsiteX30" y="connsiteY30"/>
+              </a:cxn>
+              <a:cxn ang="0">
+                <a:pos x="connsiteX31" y="connsiteY31"/>
+              </a:cxn>
+              <a:cxn ang="0">
+                <a:pos x="connsiteX32" y="connsiteY32"/>
+              </a:cxn>
+              <a:cxn ang="0">
+                <a:pos x="connsiteX33" y="connsiteY33"/>
+              </a:cxn>
+              <a:cxn ang="0">
+                <a:pos x="connsiteX34" y="connsiteY34"/>
+              </a:cxn>
+              <a:cxn ang="0">
+                <a:pos x="connsiteX35" y="connsiteY35"/>
+              </a:cxn>
+            </a:cxnLst>
+            <a:rect l="l" t="t" r="r" b="b"/>
+            <a:pathLst>
+              <a:path w="559472" h="3709642">
+                <a:moveTo>
+                  <a:pt x="0" y="0"/>
+                </a:moveTo>
+                <a:lnTo>
+                  <a:pt x="473952" y="0"/>
+                </a:lnTo>
+                <a:lnTo>
+                  <a:pt x="485840" y="161194"/>
+                </a:lnTo>
+                <a:cubicBezTo>
+                  <a:pt x="552063" y="1147770"/>
+                  <a:pt x="592441" y="3086737"/>
+                  <a:pt x="523949" y="3672197"/>
+                </a:cubicBezTo>
+                <a:cubicBezTo>
+                  <a:pt x="500842" y="3684557"/>
+                  <a:pt x="477855" y="3697282"/>
+                  <a:pt x="454748" y="3709642"/>
+                </a:cubicBezTo>
+                <a:lnTo>
+                  <a:pt x="448224" y="3510471"/>
+                </a:lnTo>
+                <a:lnTo>
+                  <a:pt x="443564" y="3408563"/>
+                </a:lnTo>
+                <a:lnTo>
+                  <a:pt x="438902" y="3304407"/>
+                </a:lnTo>
+                <a:lnTo>
+                  <a:pt x="433941" y="3198777"/>
+                </a:lnTo>
+                <a:lnTo>
+                  <a:pt x="427584" y="3092510"/>
+                </a:lnTo>
+                <a:lnTo>
+                  <a:pt x="420988" y="2984390"/>
+                </a:lnTo>
+                <a:lnTo>
+                  <a:pt x="414330" y="2874401"/>
+                </a:lnTo>
+                <a:lnTo>
+                  <a:pt x="406840" y="2762980"/>
+                </a:lnTo>
+                <a:lnTo>
+                  <a:pt x="397745" y="2650566"/>
+                </a:lnTo>
+                <a:lnTo>
+                  <a:pt x="389154" y="2536612"/>
+                </a:lnTo>
+                <a:lnTo>
+                  <a:pt x="379225" y="2421642"/>
+                </a:lnTo>
+                <a:lnTo>
+                  <a:pt x="368316" y="2305627"/>
+                </a:lnTo>
+                <a:lnTo>
+                  <a:pt x="357466" y="2189233"/>
+                </a:lnTo>
+                <a:lnTo>
+                  <a:pt x="344982" y="2071473"/>
+                </a:lnTo>
+                <a:lnTo>
+                  <a:pt x="332466" y="1952216"/>
+                </a:lnTo>
+                <a:lnTo>
+                  <a:pt x="319121" y="1833776"/>
+                </a:lnTo>
+                <a:lnTo>
+                  <a:pt x="304408" y="1713948"/>
+                </a:lnTo>
+                <a:lnTo>
+                  <a:pt x="288685" y="1592703"/>
+                </a:lnTo>
+                <a:lnTo>
+                  <a:pt x="273050" y="1471451"/>
+                </a:lnTo>
+                <a:lnTo>
+                  <a:pt x="255813" y="1350328"/>
+                </a:lnTo>
+                <a:lnTo>
+                  <a:pt x="237060" y="1227080"/>
+                </a:lnTo>
+                <a:lnTo>
+                  <a:pt x="218488" y="1106065"/>
+                </a:lnTo>
+                <a:lnTo>
+                  <a:pt x="198221" y="982940"/>
+                </a:lnTo>
+                <a:lnTo>
+                  <a:pt x="177152" y="858755"/>
+                </a:lnTo>
+                <a:lnTo>
+                  <a:pt x="155551" y="736861"/>
+                </a:lnTo>
+                <a:lnTo>
+                  <a:pt x="131782" y="613645"/>
+                </a:lnTo>
+                <a:lnTo>
+                  <a:pt x="107123" y="490500"/>
+                </a:lnTo>
+                <a:lnTo>
+                  <a:pt x="82552" y="367348"/>
+                </a:lnTo>
+                <a:lnTo>
+                  <a:pt x="55608" y="244762"/>
+                </a:lnTo>
+                <a:lnTo>
+                  <a:pt x="28130" y="122220"/>
+                </a:lnTo>
+                <a:lnTo>
+                  <a:pt x="0" y="0"/>
+                </a:lnTo>
+                <a:close/>
+              </a:path>
+            </a:pathLst>
+          </a:custGeom>
+          <a:solidFill>
+            <a:schemeClr val="tx1">
+              <a:alpha val="20000"/>
+            </a:schemeClr>
+          </a:solidFill>
+          <a:ln>
+            <a:noFill/>
+          </a:ln>
+        </p:spPr>
+        <p:txBody>
+          <a:bodyPr rtlCol="0" anchor="ctr"/>
+          <a:lstStyle/>
+          <a:p>
+            <a:pPr marL="0" marR="0" lvl="0" indent="0" algn="ctr" defTabSz="914400" rtl="0" eaLnBrk="1" fontAlgn="auto" latinLnBrk="0" hangingPunct="1">
+              <a:lnSpc>
+                <a:spcPct val="100000"/>
+              </a:lnSpc>
+              <a:spcBef>
+                <a:spcPts val="0"/>
+              </a:spcBef>
+              <a:spcAft>
+                <a:spcPts val="0"/>
+              </a:spcAft>
+              <a:buClrTx/>
+              <a:buSzTx/>
+              <a:buFontTx/>
+              <a:buNone/>
+              <a:tabLst/>
+              <a:defRPr/>
+            </a:pPr>
+            <a:endParaRPr kumimoji="0" lang="en-US" sz="1800" b="0" i="0" u="none" strike="noStrike" kern="1200" cap="none" spc="0" normalizeH="0" baseline="0" noProof="0">
+              <a:ln>
+                <a:noFill/>
+              </a:ln>
+              <a:solidFill>
+                <a:prstClr val="white"/>
+              </a:solidFill>
+              <a:effectLst/>
+              <a:uLnTx/>
+              <a:uFillTx/>
+              <a:latin typeface="Century Gothic" panose="020B0502020202020204"/>
+              <a:ea typeface="+mn-ea"/>
+              <a:cs typeface="+mn-cs"/>
+            </a:endParaRPr>
+          </a:p>
+        </p:txBody>
+      </p:sp>
+      <p:pic>
+        <p:nvPicPr>
+          <p:cNvPr id="7" name="Immagine 6" descr="Immagine che contiene musica, Strumento musicale, chitarra, persona&#10;&#10;Descrizione generata automaticamente">
+            <a:extLst>
+              <a:ext uri="{FF2B5EF4-FFF2-40B4-BE49-F238E27FC236}">
+                <a16:creationId xmlns:a16="http://schemas.microsoft.com/office/drawing/2014/main" id="{2DEC5DF2-251F-32F3-FCE3-584EA11801DD}"/>
+              </a:ext>
+            </a:extLst>
+          </p:cNvPr>
+          <p:cNvPicPr>
+            <a:picLocks noChangeAspect="1"/>
+          </p:cNvPicPr>
+          <p:nvPr/>
+        </p:nvPicPr>
+        <p:blipFill rotWithShape="1">
+          <a:blip r:embed="rId4">
+            <a:extLst>
+              <a:ext uri="{28A0092B-C50C-407E-A947-70E740481C1C}">
+                <a14:useLocalDpi xmlns:a14="http://schemas.microsoft.com/office/drawing/2010/main" val="0"/>
+              </a:ext>
+            </a:extLst>
+          </a:blip>
+          <a:srcRect t="22661" r="2" b="20401"/>
+          <a:stretch/>
+        </p:blipFill>
+        <p:spPr>
+          <a:xfrm>
+            <a:off x="7220078" y="10"/>
+            <a:ext cx="4971922" cy="2285990"/>
+          </a:xfrm>
+          <a:custGeom>
+            <a:avLst/>
+            <a:gdLst/>
+            <a:ahLst/>
+            <a:cxnLst/>
+            <a:rect l="l" t="t" r="r" b="b"/>
+            <a:pathLst>
+              <a:path w="4971922" h="2286000">
+                <a:moveTo>
+                  <a:pt x="0" y="0"/>
+                </a:moveTo>
+                <a:lnTo>
+                  <a:pt x="1343538" y="0"/>
+                </a:lnTo>
+                <a:lnTo>
+                  <a:pt x="1343538" y="1"/>
+                </a:lnTo>
+                <a:lnTo>
+                  <a:pt x="4971922" y="1"/>
+                </a:lnTo>
+                <a:lnTo>
+                  <a:pt x="4971922" y="2286000"/>
+                </a:lnTo>
+                <a:lnTo>
+                  <a:pt x="232518" y="2286000"/>
+                </a:lnTo>
+                <a:lnTo>
+                  <a:pt x="227089" y="2167128"/>
+                </a:lnTo>
+                <a:lnTo>
+                  <a:pt x="218852" y="2014881"/>
+                </a:lnTo>
+                <a:lnTo>
+                  <a:pt x="210952" y="1861947"/>
+                </a:lnTo>
+                <a:lnTo>
+                  <a:pt x="200867" y="1709014"/>
+                </a:lnTo>
+                <a:lnTo>
+                  <a:pt x="188764" y="1554023"/>
+                </a:lnTo>
+                <a:lnTo>
+                  <a:pt x="176662" y="1401090"/>
+                </a:lnTo>
+                <a:lnTo>
+                  <a:pt x="162710" y="1245413"/>
+                </a:lnTo>
+                <a:lnTo>
+                  <a:pt x="147414" y="1089051"/>
+                </a:lnTo>
+                <a:lnTo>
+                  <a:pt x="131278" y="934746"/>
+                </a:lnTo>
+                <a:lnTo>
+                  <a:pt x="112452" y="778383"/>
+                </a:lnTo>
+                <a:lnTo>
+                  <a:pt x="92281" y="622707"/>
+                </a:lnTo>
+                <a:lnTo>
+                  <a:pt x="72278" y="466344"/>
+                </a:lnTo>
+                <a:lnTo>
+                  <a:pt x="48914" y="310668"/>
+                </a:lnTo>
+                <a:lnTo>
+                  <a:pt x="25045" y="155677"/>
+                </a:lnTo>
+                <a:close/>
+              </a:path>
+            </a:pathLst>
+          </a:custGeom>
+        </p:spPr>
+      </p:pic>
+      <p:sp>
+        <p:nvSpPr>
+          <p:cNvPr id="3" name="Segnaposto contenuto 2">
+            <a:extLst>
+              <a:ext uri="{FF2B5EF4-FFF2-40B4-BE49-F238E27FC236}">
+                <a16:creationId xmlns:a16="http://schemas.microsoft.com/office/drawing/2014/main" id="{C9198737-DD02-151D-6D99-55011682B3C7}"/>
+              </a:ext>
+            </a:extLst>
+          </p:cNvPr>
+          <p:cNvSpPr>
+            <a:spLocks noGrp="1"/>
+          </p:cNvSpPr>
+          <p:nvPr>
+            <p:ph idx="1"/>
+          </p:nvPr>
+        </p:nvSpPr>
+        <p:spPr>
+          <a:xfrm>
+            <a:off x="648930" y="2438400"/>
+            <a:ext cx="6188189" cy="3785419"/>
+          </a:xfrm>
+        </p:spPr>
+        <p:txBody>
+          <a:bodyPr>
+            <a:normAutofit lnSpcReduction="10000"/>
+          </a:bodyPr>
+          <a:lstStyle/>
+          <a:p>
+            <a:pPr>
+              <a:lnSpc>
+                <a:spcPct val="90000"/>
+              </a:lnSpc>
+            </a:pPr>
+            <a:r>
+              <a:rPr lang="it-IT" sz="1800" dirty="0">
+                <a:solidFill>
+                  <a:srgbClr val="FFFFFF"/>
+                </a:solidFill>
+              </a:rPr>
+              <a:t>Fingers can </a:t>
+            </a:r>
+            <a:r>
+              <a:rPr lang="it-IT" sz="1800" b="1" dirty="0" err="1">
+                <a:solidFill>
+                  <a:srgbClr val="FFFFFF"/>
+                </a:solidFill>
+              </a:rPr>
+              <a:t>not</a:t>
+            </a:r>
+            <a:r>
+              <a:rPr lang="it-IT" sz="1800" b="1" dirty="0">
+                <a:solidFill>
+                  <a:srgbClr val="FFFFFF"/>
+                </a:solidFill>
+              </a:rPr>
+              <a:t> cross</a:t>
+            </a:r>
+          </a:p>
+          <a:p>
+            <a:pPr>
+              <a:lnSpc>
+                <a:spcPct val="90000"/>
+              </a:lnSpc>
+            </a:pPr>
+            <a:endParaRPr lang="it-IT" sz="1800" dirty="0">
+              <a:solidFill>
+                <a:srgbClr val="FFFFFF"/>
+              </a:solidFill>
+            </a:endParaRPr>
+          </a:p>
+          <a:p>
+            <a:pPr>
+              <a:lnSpc>
+                <a:spcPct val="90000"/>
+              </a:lnSpc>
+            </a:pPr>
+            <a:r>
+              <a:rPr lang="it-IT" sz="1800" b="1" dirty="0">
+                <a:solidFill>
+                  <a:srgbClr val="FFFFFF"/>
+                </a:solidFill>
+              </a:rPr>
+              <a:t>Left-</a:t>
+            </a:r>
+            <a:r>
+              <a:rPr lang="it-IT" sz="1800" b="1" dirty="0" err="1">
+                <a:solidFill>
+                  <a:srgbClr val="FFFFFF"/>
+                </a:solidFill>
+              </a:rPr>
+              <a:t>most</a:t>
+            </a:r>
+            <a:r>
+              <a:rPr lang="it-IT" sz="1800" b="1" dirty="0">
+                <a:solidFill>
+                  <a:srgbClr val="FFFFFF"/>
+                </a:solidFill>
+              </a:rPr>
+              <a:t> </a:t>
+            </a:r>
+            <a:r>
+              <a:rPr lang="it-IT" sz="1800" b="1" dirty="0" err="1">
+                <a:solidFill>
+                  <a:srgbClr val="FFFFFF"/>
+                </a:solidFill>
+              </a:rPr>
+              <a:t>fret</a:t>
+            </a:r>
+            <a:r>
+              <a:rPr lang="it-IT" sz="1800" b="1" dirty="0">
+                <a:solidFill>
+                  <a:srgbClr val="FFFFFF"/>
+                </a:solidFill>
+              </a:rPr>
+              <a:t> </a:t>
+            </a:r>
+            <a:r>
+              <a:rPr lang="it-IT" sz="1800" dirty="0" err="1">
+                <a:solidFill>
+                  <a:srgbClr val="FFFFFF"/>
+                </a:solidFill>
+              </a:rPr>
+              <a:t>will</a:t>
+            </a:r>
+            <a:r>
+              <a:rPr lang="it-IT" sz="1800" dirty="0">
+                <a:solidFill>
+                  <a:srgbClr val="FFFFFF"/>
+                </a:solidFill>
+              </a:rPr>
+              <a:t> </a:t>
+            </a:r>
+            <a:r>
+              <a:rPr lang="it-IT" sz="1800" dirty="0" err="1">
+                <a:solidFill>
+                  <a:srgbClr val="FFFFFF"/>
+                </a:solidFill>
+              </a:rPr>
+              <a:t>always</a:t>
+            </a:r>
+            <a:r>
+              <a:rPr lang="it-IT" sz="1800" dirty="0">
+                <a:solidFill>
+                  <a:srgbClr val="FFFFFF"/>
+                </a:solidFill>
+              </a:rPr>
+              <a:t> be </a:t>
+            </a:r>
+            <a:r>
+              <a:rPr lang="it-IT" sz="1800" dirty="0" err="1">
+                <a:solidFill>
+                  <a:srgbClr val="FFFFFF"/>
+                </a:solidFill>
+              </a:rPr>
+              <a:t>assigned</a:t>
+            </a:r>
+            <a:r>
+              <a:rPr lang="it-IT" sz="1800" dirty="0">
+                <a:solidFill>
+                  <a:srgbClr val="FFFFFF"/>
+                </a:solidFill>
+              </a:rPr>
+              <a:t> to the </a:t>
+            </a:r>
+            <a:r>
+              <a:rPr lang="it-IT" sz="1800" b="1" dirty="0">
+                <a:solidFill>
+                  <a:srgbClr val="FFFFFF"/>
+                </a:solidFill>
+              </a:rPr>
+              <a:t>index finger </a:t>
+            </a:r>
+            <a:r>
+              <a:rPr lang="it-IT" sz="1800" dirty="0">
+                <a:solidFill>
+                  <a:srgbClr val="FFFFFF"/>
+                </a:solidFill>
+              </a:rPr>
+              <a:t>(</a:t>
+            </a:r>
+            <a:r>
+              <a:rPr lang="it-IT" sz="1800" dirty="0" err="1">
+                <a:solidFill>
+                  <a:srgbClr val="FFFFFF"/>
+                </a:solidFill>
+              </a:rPr>
+              <a:t>always</a:t>
+            </a:r>
+            <a:r>
+              <a:rPr lang="it-IT" sz="1800" dirty="0">
+                <a:solidFill>
+                  <a:srgbClr val="FFFFFF"/>
+                </a:solidFill>
+              </a:rPr>
+              <a:t> </a:t>
+            </a:r>
+            <a:r>
+              <a:rPr lang="it-IT" sz="1800" dirty="0" err="1">
+                <a:solidFill>
+                  <a:srgbClr val="FFFFFF"/>
+                </a:solidFill>
+              </a:rPr>
+              <a:t>possible</a:t>
+            </a:r>
+            <a:r>
+              <a:rPr lang="it-IT" sz="1800" dirty="0">
+                <a:solidFill>
+                  <a:srgbClr val="FFFFFF"/>
+                </a:solidFill>
+              </a:rPr>
+              <a:t> to </a:t>
+            </a:r>
+            <a:r>
+              <a:rPr lang="it-IT" sz="1800" dirty="0" err="1">
+                <a:solidFill>
+                  <a:srgbClr val="FFFFFF"/>
+                </a:solidFill>
+              </a:rPr>
+              <a:t>find</a:t>
+            </a:r>
+            <a:r>
+              <a:rPr lang="it-IT" sz="1800" dirty="0">
+                <a:solidFill>
+                  <a:srgbClr val="FFFFFF"/>
+                </a:solidFill>
+              </a:rPr>
+              <a:t> a </a:t>
+            </a:r>
+            <a:r>
+              <a:rPr lang="it-IT" sz="1800" dirty="0" err="1">
+                <a:solidFill>
+                  <a:srgbClr val="FFFFFF"/>
+                </a:solidFill>
+              </a:rPr>
+              <a:t>voicing</a:t>
+            </a:r>
+            <a:r>
+              <a:rPr lang="it-IT" sz="1800" dirty="0">
+                <a:solidFill>
+                  <a:srgbClr val="FFFFFF"/>
+                </a:solidFill>
+              </a:rPr>
+              <a:t>)</a:t>
+            </a:r>
+          </a:p>
+          <a:p>
+            <a:pPr>
+              <a:lnSpc>
+                <a:spcPct val="90000"/>
+              </a:lnSpc>
+            </a:pPr>
+            <a:endParaRPr lang="it-IT" sz="1800" dirty="0">
+              <a:solidFill>
+                <a:srgbClr val="FFFFFF"/>
+              </a:solidFill>
+            </a:endParaRPr>
+          </a:p>
+          <a:p>
+            <a:pPr>
+              <a:lnSpc>
+                <a:spcPct val="90000"/>
+              </a:lnSpc>
+            </a:pPr>
+            <a:r>
+              <a:rPr lang="it-IT" sz="1800" dirty="0" err="1">
+                <a:solidFill>
+                  <a:srgbClr val="FFFFFF"/>
+                </a:solidFill>
+              </a:rPr>
+              <a:t>Adjacent</a:t>
+            </a:r>
+            <a:r>
+              <a:rPr lang="it-IT" sz="1800" dirty="0">
+                <a:solidFill>
+                  <a:srgbClr val="FFFFFF"/>
+                </a:solidFill>
+              </a:rPr>
+              <a:t> fingers must press </a:t>
+            </a:r>
+            <a:r>
+              <a:rPr lang="it-IT" sz="1800" dirty="0" err="1">
+                <a:solidFill>
+                  <a:srgbClr val="FFFFFF"/>
+                </a:solidFill>
+              </a:rPr>
+              <a:t>adjacent</a:t>
+            </a:r>
+            <a:r>
+              <a:rPr lang="it-IT" sz="1800" dirty="0">
+                <a:solidFill>
+                  <a:srgbClr val="FFFFFF"/>
+                </a:solidFill>
+              </a:rPr>
+              <a:t> </a:t>
+            </a:r>
+            <a:r>
+              <a:rPr lang="it-IT" sz="1800" dirty="0" err="1">
+                <a:solidFill>
+                  <a:srgbClr val="FFFFFF"/>
+                </a:solidFill>
+              </a:rPr>
+              <a:t>frets</a:t>
+            </a:r>
+            <a:r>
+              <a:rPr lang="it-IT" sz="1800" dirty="0">
+                <a:solidFill>
+                  <a:srgbClr val="FFFFFF"/>
+                </a:solidFill>
+              </a:rPr>
+              <a:t> (+1 stretch </a:t>
+            </a:r>
+            <a:r>
+              <a:rPr lang="it-IT" sz="1800" dirty="0" err="1">
+                <a:solidFill>
+                  <a:srgbClr val="FFFFFF"/>
+                </a:solidFill>
+              </a:rPr>
+              <a:t>allowed</a:t>
+            </a:r>
+            <a:r>
+              <a:rPr lang="it-IT" sz="1800" dirty="0">
+                <a:solidFill>
+                  <a:srgbClr val="FFFFFF"/>
+                </a:solidFill>
+              </a:rPr>
+              <a:t> in </a:t>
+            </a:r>
+            <a:r>
+              <a:rPr lang="it-IT" sz="1800" dirty="0" err="1">
+                <a:solidFill>
+                  <a:srgbClr val="FFFFFF"/>
+                </a:solidFill>
+              </a:rPr>
+              <a:t>difficult</a:t>
+            </a:r>
+            <a:r>
+              <a:rPr lang="it-IT" sz="1800" dirty="0">
+                <a:solidFill>
+                  <a:srgbClr val="FFFFFF"/>
+                </a:solidFill>
+              </a:rPr>
+              <a:t> mode)</a:t>
+            </a:r>
+          </a:p>
+          <a:p>
+            <a:pPr>
+              <a:lnSpc>
+                <a:spcPct val="90000"/>
+              </a:lnSpc>
+            </a:pPr>
+            <a:endParaRPr lang="it-IT" sz="1800" dirty="0">
+              <a:solidFill>
+                <a:srgbClr val="FFFFFF"/>
+              </a:solidFill>
+            </a:endParaRPr>
+          </a:p>
+          <a:p>
+            <a:pPr>
+              <a:lnSpc>
+                <a:spcPct val="90000"/>
+              </a:lnSpc>
+            </a:pPr>
+            <a:r>
+              <a:rPr lang="it-IT" sz="1800" dirty="0">
+                <a:solidFill>
+                  <a:srgbClr val="FFFFFF"/>
+                </a:solidFill>
+              </a:rPr>
+              <a:t>Maximum </a:t>
+            </a:r>
+            <a:r>
+              <a:rPr lang="it-IT" sz="1800" dirty="0" err="1">
+                <a:solidFill>
+                  <a:srgbClr val="FFFFFF"/>
+                </a:solidFill>
+              </a:rPr>
+              <a:t>chord</a:t>
+            </a:r>
+            <a:r>
+              <a:rPr lang="it-IT" sz="1800" dirty="0">
+                <a:solidFill>
+                  <a:srgbClr val="FFFFFF"/>
+                </a:solidFill>
+              </a:rPr>
+              <a:t> </a:t>
+            </a:r>
+            <a:r>
+              <a:rPr lang="it-IT" sz="1800" b="1" dirty="0" err="1">
+                <a:solidFill>
+                  <a:srgbClr val="FFFFFF"/>
+                </a:solidFill>
+              </a:rPr>
+              <a:t>width</a:t>
+            </a:r>
+            <a:r>
+              <a:rPr lang="it-IT" sz="1800" dirty="0">
+                <a:solidFill>
+                  <a:srgbClr val="FFFFFF"/>
+                </a:solidFill>
+              </a:rPr>
+              <a:t> must </a:t>
+            </a:r>
+            <a:r>
+              <a:rPr lang="it-IT" sz="1800" dirty="0" err="1">
+                <a:solidFill>
+                  <a:srgbClr val="FFFFFF"/>
+                </a:solidFill>
+              </a:rPr>
+              <a:t>not</a:t>
+            </a:r>
+            <a:r>
+              <a:rPr lang="it-IT" sz="1800" dirty="0">
+                <a:solidFill>
+                  <a:srgbClr val="FFFFFF"/>
+                </a:solidFill>
+              </a:rPr>
+              <a:t> </a:t>
+            </a:r>
+            <a:r>
+              <a:rPr lang="it-IT" sz="1800" dirty="0" err="1">
+                <a:solidFill>
+                  <a:srgbClr val="FFFFFF"/>
+                </a:solidFill>
+              </a:rPr>
+              <a:t>exceed</a:t>
+            </a:r>
+            <a:r>
+              <a:rPr lang="it-IT" sz="1800" dirty="0">
+                <a:solidFill>
+                  <a:srgbClr val="FFFFFF"/>
+                </a:solidFill>
+              </a:rPr>
+              <a:t> </a:t>
+            </a:r>
+            <a:r>
+              <a:rPr lang="it-IT" sz="1800" b="1" dirty="0">
+                <a:solidFill>
+                  <a:srgbClr val="FFFFFF"/>
+                </a:solidFill>
+              </a:rPr>
+              <a:t>4 </a:t>
+            </a:r>
+            <a:r>
+              <a:rPr lang="it-IT" sz="1800" b="1" dirty="0" err="1">
+                <a:solidFill>
+                  <a:srgbClr val="FFFFFF"/>
+                </a:solidFill>
+              </a:rPr>
+              <a:t>frets</a:t>
+            </a:r>
+            <a:r>
+              <a:rPr lang="it-IT" sz="1800" b="1" dirty="0">
+                <a:solidFill>
+                  <a:srgbClr val="FFFFFF"/>
+                </a:solidFill>
+              </a:rPr>
+              <a:t> </a:t>
+            </a:r>
+            <a:r>
+              <a:rPr lang="it-IT" sz="1800" dirty="0">
+                <a:solidFill>
+                  <a:srgbClr val="FFFFFF"/>
+                </a:solidFill>
+              </a:rPr>
+              <a:t>(5 in </a:t>
+            </a:r>
+            <a:r>
+              <a:rPr lang="it-IT" sz="1800" dirty="0" err="1">
+                <a:solidFill>
+                  <a:srgbClr val="FFFFFF"/>
+                </a:solidFill>
+              </a:rPr>
+              <a:t>difficult</a:t>
+            </a:r>
+            <a:r>
+              <a:rPr lang="it-IT" sz="1800" dirty="0">
+                <a:solidFill>
+                  <a:srgbClr val="FFFFFF"/>
+                </a:solidFill>
+              </a:rPr>
+              <a:t> mode)</a:t>
+            </a:r>
+          </a:p>
+          <a:p>
+            <a:pPr>
+              <a:lnSpc>
+                <a:spcPct val="90000"/>
+              </a:lnSpc>
+            </a:pPr>
+            <a:endParaRPr lang="it-IT" sz="1800" dirty="0">
+              <a:solidFill>
+                <a:srgbClr val="FFFFFF"/>
+              </a:solidFill>
+            </a:endParaRPr>
+          </a:p>
+          <a:p>
+            <a:pPr>
+              <a:lnSpc>
+                <a:spcPct val="90000"/>
+              </a:lnSpc>
+            </a:pPr>
+            <a:r>
+              <a:rPr lang="it-IT" sz="1800" dirty="0">
+                <a:solidFill>
+                  <a:srgbClr val="FFFFFF"/>
+                </a:solidFill>
+              </a:rPr>
+              <a:t>Check </a:t>
+            </a:r>
+            <a:r>
+              <a:rPr lang="it-IT" sz="1800" dirty="0" err="1">
+                <a:solidFill>
+                  <a:srgbClr val="FFFFFF"/>
+                </a:solidFill>
+              </a:rPr>
+              <a:t>if</a:t>
+            </a:r>
+            <a:r>
+              <a:rPr lang="it-IT" sz="1800" dirty="0">
+                <a:solidFill>
+                  <a:srgbClr val="FFFFFF"/>
+                </a:solidFill>
+              </a:rPr>
+              <a:t> </a:t>
+            </a:r>
+            <a:r>
+              <a:rPr lang="it-IT" sz="1800" b="1" dirty="0">
+                <a:solidFill>
+                  <a:srgbClr val="FFFFFF"/>
+                </a:solidFill>
+              </a:rPr>
+              <a:t>barre</a:t>
+            </a:r>
+            <a:r>
+              <a:rPr lang="it-IT" sz="1800" dirty="0">
+                <a:solidFill>
+                  <a:srgbClr val="FFFFFF"/>
+                </a:solidFill>
+              </a:rPr>
+              <a:t> can be </a:t>
+            </a:r>
+            <a:r>
+              <a:rPr lang="it-IT" sz="1800" dirty="0" err="1">
+                <a:solidFill>
+                  <a:srgbClr val="FFFFFF"/>
+                </a:solidFill>
+              </a:rPr>
+              <a:t>used</a:t>
+            </a:r>
+            <a:endParaRPr lang="it-IT" sz="1800" dirty="0">
+              <a:solidFill>
+                <a:srgbClr val="FFFFFF"/>
+              </a:solidFill>
+            </a:endParaRPr>
+          </a:p>
+          <a:p>
+            <a:pPr>
+              <a:lnSpc>
+                <a:spcPct val="90000"/>
+              </a:lnSpc>
+            </a:pPr>
+            <a:endParaRPr lang="it-IT" sz="1800" dirty="0">
+              <a:solidFill>
+                <a:srgbClr val="FFFFFF"/>
+              </a:solidFill>
+            </a:endParaRPr>
+          </a:p>
+        </p:txBody>
+      </p:sp>
+      <p:pic>
+        <p:nvPicPr>
+          <p:cNvPr id="1028" name="Picture 4">
+            <a:extLst>
+              <a:ext uri="{FF2B5EF4-FFF2-40B4-BE49-F238E27FC236}">
+                <a16:creationId xmlns:a16="http://schemas.microsoft.com/office/drawing/2014/main" id="{4B54DAF9-BC56-42F1-6584-67DC6A3F598E}"/>
+              </a:ext>
+            </a:extLst>
+          </p:cNvPr>
+          <p:cNvPicPr>
+            <a:picLocks noChangeAspect="1" noChangeArrowheads="1"/>
+          </p:cNvPicPr>
+          <p:nvPr/>
+        </p:nvPicPr>
+        <p:blipFill rotWithShape="1">
+          <a:blip r:embed="rId5">
+            <a:extLst>
+              <a:ext uri="{28A0092B-C50C-407E-A947-70E740481C1C}">
+                <a14:useLocalDpi xmlns:a14="http://schemas.microsoft.com/office/drawing/2010/main" val="0"/>
+              </a:ext>
+            </a:extLst>
+          </a:blip>
+          <a:srcRect t="25183" r="-2" b="25633"/>
+          <a:stretch/>
+        </p:blipFill>
+        <p:spPr bwMode="auto">
+          <a:xfrm>
+            <a:off x="7437114" y="2286000"/>
+            <a:ext cx="4754886" cy="2286000"/>
+          </a:xfrm>
+          <a:custGeom>
+            <a:avLst/>
+            <a:gdLst/>
+            <a:ahLst/>
+            <a:cxnLst/>
+            <a:rect l="l" t="t" r="r" b="b"/>
+            <a:pathLst>
+              <a:path w="4754886" h="2286000">
+                <a:moveTo>
+                  <a:pt x="15482" y="0"/>
+                </a:moveTo>
+                <a:lnTo>
+                  <a:pt x="4754886" y="0"/>
+                </a:lnTo>
+                <a:lnTo>
+                  <a:pt x="4754886" y="2286000"/>
+                </a:lnTo>
+                <a:lnTo>
+                  <a:pt x="0" y="2286000"/>
+                </a:lnTo>
+                <a:lnTo>
+                  <a:pt x="8036" y="2135352"/>
+                </a:lnTo>
+                <a:lnTo>
+                  <a:pt x="12742" y="2007793"/>
+                </a:lnTo>
+                <a:lnTo>
+                  <a:pt x="17953" y="1877492"/>
+                </a:lnTo>
+                <a:lnTo>
+                  <a:pt x="22827" y="1745133"/>
+                </a:lnTo>
+                <a:lnTo>
+                  <a:pt x="26021" y="1612087"/>
+                </a:lnTo>
+                <a:lnTo>
+                  <a:pt x="28879" y="1476299"/>
+                </a:lnTo>
+                <a:lnTo>
+                  <a:pt x="31904" y="1339139"/>
+                </a:lnTo>
+                <a:lnTo>
+                  <a:pt x="33921" y="1199236"/>
+                </a:lnTo>
+                <a:lnTo>
+                  <a:pt x="33921" y="1057961"/>
+                </a:lnTo>
+                <a:lnTo>
+                  <a:pt x="34930" y="915315"/>
+                </a:lnTo>
+                <a:lnTo>
+                  <a:pt x="33921" y="771297"/>
+                </a:lnTo>
+                <a:lnTo>
+                  <a:pt x="31904" y="625221"/>
+                </a:lnTo>
+                <a:lnTo>
+                  <a:pt x="30055" y="479146"/>
+                </a:lnTo>
+                <a:lnTo>
+                  <a:pt x="26021" y="331013"/>
+                </a:lnTo>
+                <a:lnTo>
+                  <a:pt x="21819" y="181509"/>
+                </a:lnTo>
+                <a:lnTo>
+                  <a:pt x="16944" y="32004"/>
+                </a:lnTo>
+                <a:close/>
+              </a:path>
+            </a:pathLst>
+          </a:custGeom>
+          <a:noFill/>
+          <a:extLst>
+            <a:ext uri="{909E8E84-426E-40DD-AFC4-6F175D3DCCD1}">
+              <a14:hiddenFill xmlns:a14="http://schemas.microsoft.com/office/drawing/2010/main">
+                <a:solidFill>
+                  <a:srgbClr val="FFFFFF"/>
+                </a:solidFill>
+              </a14:hiddenFill>
+            </a:ext>
+          </a:extLst>
+        </p:spPr>
+      </p:pic>
+      <p:pic>
+        <p:nvPicPr>
+          <p:cNvPr id="5" name="Immagine 4" descr="Immagine che contiene Strumento musicale, musica, chitarra, persona&#10;&#10;Descrizione generata automaticamente">
+            <a:extLst>
+              <a:ext uri="{FF2B5EF4-FFF2-40B4-BE49-F238E27FC236}">
+                <a16:creationId xmlns:a16="http://schemas.microsoft.com/office/drawing/2014/main" id="{12D5DE69-53B2-63BF-A569-4ADEACF2BA82}"/>
+              </a:ext>
+            </a:extLst>
+          </p:cNvPr>
+          <p:cNvPicPr>
+            <a:picLocks noChangeAspect="1"/>
+          </p:cNvPicPr>
+          <p:nvPr/>
+        </p:nvPicPr>
+        <p:blipFill rotWithShape="1">
+          <a:blip r:embed="rId6">
+            <a:extLst>
+              <a:ext uri="{28A0092B-C50C-407E-A947-70E740481C1C}">
+                <a14:useLocalDpi xmlns:a14="http://schemas.microsoft.com/office/drawing/2010/main" val="0"/>
+              </a:ext>
+            </a:extLst>
+          </a:blip>
+          <a:srcRect t="15023" r="2" b="9313"/>
+          <a:stretch/>
+        </p:blipFill>
+        <p:spPr>
+          <a:xfrm>
+            <a:off x="7218902" y="4572000"/>
+            <a:ext cx="4973099" cy="2286000"/>
+          </a:xfrm>
+          <a:custGeom>
+            <a:avLst/>
+            <a:gdLst/>
+            <a:ahLst/>
+            <a:cxnLst/>
+            <a:rect l="l" t="t" r="r" b="b"/>
+            <a:pathLst>
+              <a:path w="4973099" h="2286000">
+                <a:moveTo>
+                  <a:pt x="218212" y="0"/>
+                </a:moveTo>
+                <a:lnTo>
+                  <a:pt x="4973099" y="0"/>
+                </a:lnTo>
+                <a:lnTo>
+                  <a:pt x="4973099" y="2286000"/>
+                </a:lnTo>
+                <a:lnTo>
+                  <a:pt x="897889" y="2286000"/>
+                </a:lnTo>
+                <a:lnTo>
+                  <a:pt x="0" y="2286000"/>
+                </a:lnTo>
+                <a:lnTo>
+                  <a:pt x="5883" y="2245538"/>
+                </a:lnTo>
+                <a:lnTo>
+                  <a:pt x="23197" y="2126894"/>
+                </a:lnTo>
+                <a:lnTo>
+                  <a:pt x="35299" y="2040483"/>
+                </a:lnTo>
+                <a:lnTo>
+                  <a:pt x="48074" y="1937613"/>
+                </a:lnTo>
+                <a:lnTo>
+                  <a:pt x="63370" y="1815541"/>
+                </a:lnTo>
+                <a:lnTo>
+                  <a:pt x="79507" y="1680438"/>
+                </a:lnTo>
+                <a:lnTo>
+                  <a:pt x="96484" y="1528191"/>
+                </a:lnTo>
+                <a:lnTo>
+                  <a:pt x="114469" y="1362227"/>
+                </a:lnTo>
+                <a:lnTo>
+                  <a:pt x="132455" y="1181862"/>
+                </a:lnTo>
+                <a:lnTo>
+                  <a:pt x="150776" y="989838"/>
+                </a:lnTo>
+                <a:lnTo>
+                  <a:pt x="167753" y="782726"/>
+                </a:lnTo>
+                <a:lnTo>
+                  <a:pt x="184058" y="566013"/>
+                </a:lnTo>
+                <a:lnTo>
+                  <a:pt x="198850" y="336956"/>
+                </a:lnTo>
+                <a:lnTo>
+                  <a:pt x="212969" y="98298"/>
+                </a:lnTo>
+                <a:close/>
+              </a:path>
+            </a:pathLst>
+          </a:custGeom>
+        </p:spPr>
+      </p:pic>
+    </p:spTree>
+    <p:extLst>
+      <p:ext uri="{BB962C8B-B14F-4D97-AF65-F5344CB8AC3E}">
+        <p14:creationId xmlns:p14="http://schemas.microsoft.com/office/powerpoint/2010/main" val="2899581696"/>
+      </p:ext>
+    </p:extLst>
+  </p:cSld>
+  <p:clrMapOvr>
+    <a:masterClrMapping/>
+  </p:clrMapOvr>
+</p:sld>
+</file>
+
+<file path=ppt/slides/slide11.xml><?xml version="1.0" encoding="utf-8"?>
+<p:sld xmlns:a="http://schemas.openxmlformats.org/drawingml/2006/main" xmlns:r="http://schemas.openxmlformats.org/officeDocument/2006/relationships" xmlns:p="http://schemas.openxmlformats.org/presentationml/2006/main">
+  <p:cSld>
+    <p:bg>
+      <p:bgPr>
         <a:solidFill>
           <a:schemeClr val="bg2"/>
         </a:solidFill>
@@ -25272,7 +26724,7 @@
 </p:sld>
 </file>
 
-<file path=ppt/slides/slide11.xml><?xml version="1.0" encoding="utf-8"?>
+<file path=ppt/slides/slide12.xml><?xml version="1.0" encoding="utf-8"?>
 <p:sld xmlns:a="http://schemas.openxmlformats.org/drawingml/2006/main" xmlns:r="http://schemas.openxmlformats.org/officeDocument/2006/relationships" xmlns:p="http://schemas.openxmlformats.org/presentationml/2006/main">
   <p:cSld>
     <p:bg>
@@ -26707,7 +28159,7 @@
 </p:sld>
 </file>
 
-<file path=ppt/slides/slide12.xml><?xml version="1.0" encoding="utf-8"?>
+<file path=ppt/slides/slide13.xml><?xml version="1.0" encoding="utf-8"?>
 <p:sld xmlns:a="http://schemas.openxmlformats.org/drawingml/2006/main" xmlns:r="http://schemas.openxmlformats.org/officeDocument/2006/relationships" xmlns:p="http://schemas.openxmlformats.org/presentationml/2006/main">
   <p:cSld>
     <p:bg>
@@ -33088,6 +34540,97 @@
 </file>
 
 <file path=ppt/slides/slide7.xml><?xml version="1.0" encoding="utf-8"?>
+<p:sld xmlns:a="http://schemas.openxmlformats.org/drawingml/2006/main" xmlns:r="http://schemas.openxmlformats.org/officeDocument/2006/relationships" xmlns:p="http://schemas.openxmlformats.org/presentationml/2006/main">
+  <p:cSld>
+    <p:spTree>
+      <p:nvGrpSpPr>
+        <p:cNvPr id="1" name=""/>
+        <p:cNvGrpSpPr/>
+        <p:nvPr/>
+      </p:nvGrpSpPr>
+      <p:grpSpPr>
+        <a:xfrm>
+          <a:off x="0" y="0"/>
+          <a:ext cx="0" cy="0"/>
+          <a:chOff x="0" y="0"/>
+          <a:chExt cx="0" cy="0"/>
+        </a:xfrm>
+      </p:grpSpPr>
+      <p:sp>
+        <p:nvSpPr>
+          <p:cNvPr id="2" name="Titolo 1">
+            <a:extLst>
+              <a:ext uri="{FF2B5EF4-FFF2-40B4-BE49-F238E27FC236}">
+                <a16:creationId xmlns:a16="http://schemas.microsoft.com/office/drawing/2014/main" id="{C70D1743-8D1E-56AB-B4F4-569A5439CFCB}"/>
+              </a:ext>
+            </a:extLst>
+          </p:cNvPr>
+          <p:cNvSpPr>
+            <a:spLocks noGrp="1"/>
+          </p:cNvSpPr>
+          <p:nvPr>
+            <p:ph type="title"/>
+          </p:nvPr>
+        </p:nvSpPr>
+        <p:spPr/>
+        <p:txBody>
+          <a:bodyPr/>
+          <a:lstStyle/>
+          <a:p>
+            <a:r>
+              <a:rPr lang="it-IT" dirty="0"/>
+              <a:t>Code </a:t>
+            </a:r>
+            <a:r>
+              <a:rPr lang="it-IT" dirty="0" err="1"/>
+              <a:t>organization</a:t>
+            </a:r>
+            <a:endParaRPr lang="it-IT" dirty="0"/>
+          </a:p>
+        </p:txBody>
+      </p:sp>
+      <p:sp>
+        <p:nvSpPr>
+          <p:cNvPr id="3" name="Segnaposto contenuto 2">
+            <a:extLst>
+              <a:ext uri="{FF2B5EF4-FFF2-40B4-BE49-F238E27FC236}">
+                <a16:creationId xmlns:a16="http://schemas.microsoft.com/office/drawing/2014/main" id="{06F85931-9A26-C0E9-83C3-27034F0C7ACB}"/>
+              </a:ext>
+            </a:extLst>
+          </p:cNvPr>
+          <p:cNvSpPr>
+            <a:spLocks noGrp="1"/>
+          </p:cNvSpPr>
+          <p:nvPr>
+            <p:ph idx="1"/>
+          </p:nvPr>
+        </p:nvSpPr>
+        <p:spPr/>
+        <p:txBody>
+          <a:bodyPr/>
+          <a:lstStyle/>
+          <a:p>
+            <a:pPr marL="0" indent="0">
+              <a:buNone/>
+            </a:pPr>
+            <a:endParaRPr lang="it-IT" dirty="0"/>
+          </a:p>
+        </p:txBody>
+      </p:sp>
+    </p:spTree>
+    <p:extLst>
+      <p:ext uri="{BB962C8B-B14F-4D97-AF65-F5344CB8AC3E}">
+        <p14:creationId xmlns:p14="http://schemas.microsoft.com/office/powerpoint/2010/main" val="1319428925"/>
+      </p:ext>
+    </p:extLst>
+  </p:cSld>
+  <p:clrMapOvr>
+    <a:masterClrMapping/>
+  </p:clrMapOvr>
+</p:sld>
+</file>
+
+<file path=ppt/slides/slide8.xml><?xml version="1.0" encoding="utf-8"?>
 <p:sld xmlns:a="http://schemas.openxmlformats.org/drawingml/2006/main" xmlns:r="http://schemas.openxmlformats.org/officeDocument/2006/relationships" xmlns:p="http://schemas.openxmlformats.org/presentationml/2006/main">
   <p:cSld>
     <p:bg>
@@ -35112,7 +36655,7 @@
 </p:sld>
 </file>
 
-<file path=ppt/slides/slide8.xml><?xml version="1.0" encoding="utf-8"?>
+<file path=ppt/slides/slide9.xml><?xml version="1.0" encoding="utf-8"?>
 <p:sld xmlns:a="http://schemas.openxmlformats.org/drawingml/2006/main" xmlns:r="http://schemas.openxmlformats.org/officeDocument/2006/relationships" xmlns:p="http://schemas.openxmlformats.org/presentationml/2006/main">
   <p:cSld>
     <p:bg>
@@ -36360,1457 +37903,6 @@
     <p:extLst>
       <p:ext uri="{BB962C8B-B14F-4D97-AF65-F5344CB8AC3E}">
         <p14:creationId xmlns:p14="http://schemas.microsoft.com/office/powerpoint/2010/main" val="1177436343"/>
-      </p:ext>
-    </p:extLst>
-  </p:cSld>
-  <p:clrMapOvr>
-    <a:masterClrMapping/>
-  </p:clrMapOvr>
-</p:sld>
-</file>
-
-<file path=ppt/slides/slide9.xml><?xml version="1.0" encoding="utf-8"?>
-<p:sld xmlns:a="http://schemas.openxmlformats.org/drawingml/2006/main" xmlns:r="http://schemas.openxmlformats.org/officeDocument/2006/relationships" xmlns:p="http://schemas.openxmlformats.org/presentationml/2006/main">
-  <p:cSld>
-    <p:bg>
-      <p:bgPr>
-        <a:blipFill rotWithShape="1">
-          <a:blip r:embed="rId3">
-            <a:duotone>
-              <a:schemeClr val="bg2">
-                <a:shade val="69000"/>
-                <a:hueMod val="108000"/>
-                <a:satMod val="164000"/>
-                <a:lumMod val="74000"/>
-              </a:schemeClr>
-              <a:schemeClr val="bg2">
-                <a:tint val="96000"/>
-                <a:hueMod val="88000"/>
-                <a:satMod val="140000"/>
-                <a:lumMod val="132000"/>
-              </a:schemeClr>
-            </a:duotone>
-          </a:blip>
-          <a:stretch/>
-        </a:blipFill>
-        <a:effectLst/>
-      </p:bgPr>
-    </p:bg>
-    <p:spTree>
-      <p:nvGrpSpPr>
-        <p:cNvPr id="1" name=""/>
-        <p:cNvGrpSpPr/>
-        <p:nvPr/>
-      </p:nvGrpSpPr>
-      <p:grpSpPr>
-        <a:xfrm>
-          <a:off x="0" y="0"/>
-          <a:ext cx="0" cy="0"/>
-          <a:chOff x="0" y="0"/>
-          <a:chExt cx="0" cy="0"/>
-        </a:xfrm>
-      </p:grpSpPr>
-      <p:sp>
-        <p:nvSpPr>
-          <p:cNvPr id="1033" name="Rectangle 1032">
-            <a:extLst>
-              <a:ext uri="{FF2B5EF4-FFF2-40B4-BE49-F238E27FC236}">
-                <a16:creationId xmlns:a16="http://schemas.microsoft.com/office/drawing/2014/main" id="{C8A3C342-1D03-412F-8DD3-BF519E8E0AE9}"/>
-              </a:ext>
-              <a:ext uri="{C183D7F6-B498-43B3-948B-1728B52AA6E4}">
-                <adec:decorative xmlns:adec="http://schemas.microsoft.com/office/drawing/2017/decorative" val="1"/>
-              </a:ext>
-            </a:extLst>
-          </p:cNvPr>
-          <p:cNvSpPr>
-            <a:spLocks noGrp="1" noRot="1" noChangeAspect="1" noMove="1" noResize="1" noEditPoints="1" noAdjustHandles="1" noChangeArrowheads="1" noChangeShapeType="1" noTextEdit="1"/>
-          </p:cNvSpPr>
-          <p:nvPr>
-            <p:extLst>
-              <p:ext uri="{386F3935-93C4-4BCD-93E2-E3B085C9AB24}">
-                <p16:designElem xmlns:p16="http://schemas.microsoft.com/office/powerpoint/2015/main" val="1"/>
-              </p:ext>
-            </p:extLst>
-          </p:nvPr>
-        </p:nvSpPr>
-        <p:spPr>
-          <a:xfrm>
-            <a:off x="0" y="0"/>
-            <a:ext cx="12192000" cy="6858000"/>
-          </a:xfrm>
-          <a:prstGeom prst="rect">
-            <a:avLst/>
-          </a:prstGeom>
-          <a:ln>
-            <a:noFill/>
-          </a:ln>
-        </p:spPr>
-        <p:style>
-          <a:lnRef idx="2">
-            <a:schemeClr val="accent1">
-              <a:shade val="50000"/>
-            </a:schemeClr>
-          </a:lnRef>
-          <a:fillRef idx="1003">
-            <a:schemeClr val="dk2"/>
-          </a:fillRef>
-          <a:effectRef idx="0">
-            <a:schemeClr val="accent1"/>
-          </a:effectRef>
-          <a:fontRef idx="minor">
-            <a:schemeClr val="lt1"/>
-          </a:fontRef>
-        </p:style>
-        <p:txBody>
-          <a:bodyPr rtlCol="0" anchor="ctr"/>
-          <a:lstStyle/>
-          <a:p>
-            <a:pPr marL="0" marR="0" lvl="0" indent="0" algn="ctr" defTabSz="914400" rtl="0" eaLnBrk="1" fontAlgn="auto" latinLnBrk="0" hangingPunct="1">
-              <a:lnSpc>
-                <a:spcPct val="100000"/>
-              </a:lnSpc>
-              <a:spcBef>
-                <a:spcPts val="0"/>
-              </a:spcBef>
-              <a:spcAft>
-                <a:spcPts val="0"/>
-              </a:spcAft>
-              <a:buClrTx/>
-              <a:buSzTx/>
-              <a:buFontTx/>
-              <a:buNone/>
-              <a:tabLst/>
-              <a:defRPr/>
-            </a:pPr>
-            <a:endParaRPr kumimoji="0" lang="en-US" sz="1800" b="0" i="0" u="none" strike="noStrike" kern="1200" cap="none" spc="0" normalizeH="0" baseline="0" noProof="0">
-              <a:ln>
-                <a:noFill/>
-              </a:ln>
-              <a:solidFill>
-                <a:prstClr val="white"/>
-              </a:solidFill>
-              <a:effectLst/>
-              <a:uLnTx/>
-              <a:uFillTx/>
-              <a:latin typeface="Century Gothic" panose="020B0502020202020204"/>
-              <a:ea typeface="+mn-ea"/>
-              <a:cs typeface="+mn-cs"/>
-            </a:endParaRPr>
-          </a:p>
-        </p:txBody>
-      </p:sp>
-      <p:sp>
-        <p:nvSpPr>
-          <p:cNvPr id="2" name="Titolo 1">
-            <a:extLst>
-              <a:ext uri="{FF2B5EF4-FFF2-40B4-BE49-F238E27FC236}">
-                <a16:creationId xmlns:a16="http://schemas.microsoft.com/office/drawing/2014/main" id="{E24CF92A-E7B9-76DA-23C0-51A0B6EB071A}"/>
-              </a:ext>
-            </a:extLst>
-          </p:cNvPr>
-          <p:cNvSpPr>
-            <a:spLocks noGrp="1"/>
-          </p:cNvSpPr>
-          <p:nvPr>
-            <p:ph type="title"/>
-          </p:nvPr>
-        </p:nvSpPr>
-        <p:spPr>
-          <a:xfrm>
-            <a:off x="648930" y="629266"/>
-            <a:ext cx="6188190" cy="1622321"/>
-          </a:xfrm>
-        </p:spPr>
-        <p:txBody>
-          <a:bodyPr>
-            <a:normAutofit/>
-          </a:bodyPr>
-          <a:lstStyle/>
-          <a:p>
-            <a:r>
-              <a:rPr lang="it-IT">
-                <a:solidFill>
-                  <a:srgbClr val="EBEBEB"/>
-                </a:solidFill>
-              </a:rPr>
-              <a:t>FEASIBILITY CONSTRAINTS</a:t>
-            </a:r>
-          </a:p>
-        </p:txBody>
-      </p:sp>
-      <p:sp>
-        <p:nvSpPr>
-          <p:cNvPr id="1035" name="Freeform 31">
-            <a:extLst>
-              <a:ext uri="{FF2B5EF4-FFF2-40B4-BE49-F238E27FC236}">
-                <a16:creationId xmlns:a16="http://schemas.microsoft.com/office/drawing/2014/main" id="{81CC9B02-E087-4350-AEBD-2C3CF001AF01}"/>
-              </a:ext>
-              <a:ext uri="{C183D7F6-B498-43B3-948B-1728B52AA6E4}">
-                <adec:decorative xmlns:adec="http://schemas.microsoft.com/office/drawing/2017/decorative" val="1"/>
-              </a:ext>
-            </a:extLst>
-          </p:cNvPr>
-          <p:cNvSpPr>
-            <a:spLocks noGrp="1" noRot="1" noChangeAspect="1" noMove="1" noResize="1" noEditPoints="1" noAdjustHandles="1" noChangeArrowheads="1" noChangeShapeType="1" noTextEdit="1"/>
-          </p:cNvSpPr>
-          <p:nvPr>
-            <p:extLst>
-              <p:ext uri="{386F3935-93C4-4BCD-93E2-E3B085C9AB24}">
-                <p16:designElem xmlns:p16="http://schemas.microsoft.com/office/powerpoint/2015/main" val="1"/>
-              </p:ext>
-            </p:extLst>
-          </p:nvPr>
-        </p:nvSpPr>
-        <p:spPr>
-          <a:xfrm>
-            <a:off x="7015974" y="-1"/>
-            <a:ext cx="559472" cy="3709642"/>
-          </a:xfrm>
-          <a:custGeom>
-            <a:avLst/>
-            <a:gdLst>
-              <a:gd name="connsiteX0" fmla="*/ 0 w 559472"/>
-              <a:gd name="connsiteY0" fmla="*/ 0 h 3709642"/>
-              <a:gd name="connsiteX1" fmla="*/ 473952 w 559472"/>
-              <a:gd name="connsiteY1" fmla="*/ 0 h 3709642"/>
-              <a:gd name="connsiteX2" fmla="*/ 485840 w 559472"/>
-              <a:gd name="connsiteY2" fmla="*/ 161194 h 3709642"/>
-              <a:gd name="connsiteX3" fmla="*/ 523949 w 559472"/>
-              <a:gd name="connsiteY3" fmla="*/ 3672197 h 3709642"/>
-              <a:gd name="connsiteX4" fmla="*/ 454748 w 559472"/>
-              <a:gd name="connsiteY4" fmla="*/ 3709642 h 3709642"/>
-              <a:gd name="connsiteX5" fmla="*/ 448224 w 559472"/>
-              <a:gd name="connsiteY5" fmla="*/ 3510471 h 3709642"/>
-              <a:gd name="connsiteX6" fmla="*/ 443564 w 559472"/>
-              <a:gd name="connsiteY6" fmla="*/ 3408563 h 3709642"/>
-              <a:gd name="connsiteX7" fmla="*/ 438902 w 559472"/>
-              <a:gd name="connsiteY7" fmla="*/ 3304407 h 3709642"/>
-              <a:gd name="connsiteX8" fmla="*/ 433941 w 559472"/>
-              <a:gd name="connsiteY8" fmla="*/ 3198777 h 3709642"/>
-              <a:gd name="connsiteX9" fmla="*/ 427584 w 559472"/>
-              <a:gd name="connsiteY9" fmla="*/ 3092510 h 3709642"/>
-              <a:gd name="connsiteX10" fmla="*/ 420988 w 559472"/>
-              <a:gd name="connsiteY10" fmla="*/ 2984390 h 3709642"/>
-              <a:gd name="connsiteX11" fmla="*/ 414330 w 559472"/>
-              <a:gd name="connsiteY11" fmla="*/ 2874401 h 3709642"/>
-              <a:gd name="connsiteX12" fmla="*/ 406840 w 559472"/>
-              <a:gd name="connsiteY12" fmla="*/ 2762980 h 3709642"/>
-              <a:gd name="connsiteX13" fmla="*/ 397745 w 559472"/>
-              <a:gd name="connsiteY13" fmla="*/ 2650566 h 3709642"/>
-              <a:gd name="connsiteX14" fmla="*/ 389154 w 559472"/>
-              <a:gd name="connsiteY14" fmla="*/ 2536612 h 3709642"/>
-              <a:gd name="connsiteX15" fmla="*/ 379225 w 559472"/>
-              <a:gd name="connsiteY15" fmla="*/ 2421642 h 3709642"/>
-              <a:gd name="connsiteX16" fmla="*/ 368316 w 559472"/>
-              <a:gd name="connsiteY16" fmla="*/ 2305627 h 3709642"/>
-              <a:gd name="connsiteX17" fmla="*/ 357466 w 559472"/>
-              <a:gd name="connsiteY17" fmla="*/ 2189233 h 3709642"/>
-              <a:gd name="connsiteX18" fmla="*/ 344982 w 559472"/>
-              <a:gd name="connsiteY18" fmla="*/ 2071473 h 3709642"/>
-              <a:gd name="connsiteX19" fmla="*/ 332466 w 559472"/>
-              <a:gd name="connsiteY19" fmla="*/ 1952216 h 3709642"/>
-              <a:gd name="connsiteX20" fmla="*/ 319121 w 559472"/>
-              <a:gd name="connsiteY20" fmla="*/ 1833776 h 3709642"/>
-              <a:gd name="connsiteX21" fmla="*/ 304408 w 559472"/>
-              <a:gd name="connsiteY21" fmla="*/ 1713948 h 3709642"/>
-              <a:gd name="connsiteX22" fmla="*/ 288685 w 559472"/>
-              <a:gd name="connsiteY22" fmla="*/ 1592703 h 3709642"/>
-              <a:gd name="connsiteX23" fmla="*/ 273050 w 559472"/>
-              <a:gd name="connsiteY23" fmla="*/ 1471451 h 3709642"/>
-              <a:gd name="connsiteX24" fmla="*/ 255813 w 559472"/>
-              <a:gd name="connsiteY24" fmla="*/ 1350328 h 3709642"/>
-              <a:gd name="connsiteX25" fmla="*/ 237060 w 559472"/>
-              <a:gd name="connsiteY25" fmla="*/ 1227080 h 3709642"/>
-              <a:gd name="connsiteX26" fmla="*/ 218488 w 559472"/>
-              <a:gd name="connsiteY26" fmla="*/ 1106065 h 3709642"/>
-              <a:gd name="connsiteX27" fmla="*/ 198221 w 559472"/>
-              <a:gd name="connsiteY27" fmla="*/ 982940 h 3709642"/>
-              <a:gd name="connsiteX28" fmla="*/ 177152 w 559472"/>
-              <a:gd name="connsiteY28" fmla="*/ 858755 h 3709642"/>
-              <a:gd name="connsiteX29" fmla="*/ 155551 w 559472"/>
-              <a:gd name="connsiteY29" fmla="*/ 736861 h 3709642"/>
-              <a:gd name="connsiteX30" fmla="*/ 131782 w 559472"/>
-              <a:gd name="connsiteY30" fmla="*/ 613645 h 3709642"/>
-              <a:gd name="connsiteX31" fmla="*/ 107123 w 559472"/>
-              <a:gd name="connsiteY31" fmla="*/ 490500 h 3709642"/>
-              <a:gd name="connsiteX32" fmla="*/ 82552 w 559472"/>
-              <a:gd name="connsiteY32" fmla="*/ 367348 h 3709642"/>
-              <a:gd name="connsiteX33" fmla="*/ 55608 w 559472"/>
-              <a:gd name="connsiteY33" fmla="*/ 244762 h 3709642"/>
-              <a:gd name="connsiteX34" fmla="*/ 28130 w 559472"/>
-              <a:gd name="connsiteY34" fmla="*/ 122220 h 3709642"/>
-              <a:gd name="connsiteX35" fmla="*/ 0 w 559472"/>
-              <a:gd name="connsiteY35" fmla="*/ 0 h 3709642"/>
-            </a:gdLst>
-            <a:ahLst/>
-            <a:cxnLst>
-              <a:cxn ang="0">
-                <a:pos x="connsiteX0" y="connsiteY0"/>
-              </a:cxn>
-              <a:cxn ang="0">
-                <a:pos x="connsiteX1" y="connsiteY1"/>
-              </a:cxn>
-              <a:cxn ang="0">
-                <a:pos x="connsiteX2" y="connsiteY2"/>
-              </a:cxn>
-              <a:cxn ang="0">
-                <a:pos x="connsiteX3" y="connsiteY3"/>
-              </a:cxn>
-              <a:cxn ang="0">
-                <a:pos x="connsiteX4" y="connsiteY4"/>
-              </a:cxn>
-              <a:cxn ang="0">
-                <a:pos x="connsiteX5" y="connsiteY5"/>
-              </a:cxn>
-              <a:cxn ang="0">
-                <a:pos x="connsiteX6" y="connsiteY6"/>
-              </a:cxn>
-              <a:cxn ang="0">
-                <a:pos x="connsiteX7" y="connsiteY7"/>
-              </a:cxn>
-              <a:cxn ang="0">
-                <a:pos x="connsiteX8" y="connsiteY8"/>
-              </a:cxn>
-              <a:cxn ang="0">
-                <a:pos x="connsiteX9" y="connsiteY9"/>
-              </a:cxn>
-              <a:cxn ang="0">
-                <a:pos x="connsiteX10" y="connsiteY10"/>
-              </a:cxn>
-              <a:cxn ang="0">
-                <a:pos x="connsiteX11" y="connsiteY11"/>
-              </a:cxn>
-              <a:cxn ang="0">
-                <a:pos x="connsiteX12" y="connsiteY12"/>
-              </a:cxn>
-              <a:cxn ang="0">
-                <a:pos x="connsiteX13" y="connsiteY13"/>
-              </a:cxn>
-              <a:cxn ang="0">
-                <a:pos x="connsiteX14" y="connsiteY14"/>
-              </a:cxn>
-              <a:cxn ang="0">
-                <a:pos x="connsiteX15" y="connsiteY15"/>
-              </a:cxn>
-              <a:cxn ang="0">
-                <a:pos x="connsiteX16" y="connsiteY16"/>
-              </a:cxn>
-              <a:cxn ang="0">
-                <a:pos x="connsiteX17" y="connsiteY17"/>
-              </a:cxn>
-              <a:cxn ang="0">
-                <a:pos x="connsiteX18" y="connsiteY18"/>
-              </a:cxn>
-              <a:cxn ang="0">
-                <a:pos x="connsiteX19" y="connsiteY19"/>
-              </a:cxn>
-              <a:cxn ang="0">
-                <a:pos x="connsiteX20" y="connsiteY20"/>
-              </a:cxn>
-              <a:cxn ang="0">
-                <a:pos x="connsiteX21" y="connsiteY21"/>
-              </a:cxn>
-              <a:cxn ang="0">
-                <a:pos x="connsiteX22" y="connsiteY22"/>
-              </a:cxn>
-              <a:cxn ang="0">
-                <a:pos x="connsiteX23" y="connsiteY23"/>
-              </a:cxn>
-              <a:cxn ang="0">
-                <a:pos x="connsiteX24" y="connsiteY24"/>
-              </a:cxn>
-              <a:cxn ang="0">
-                <a:pos x="connsiteX25" y="connsiteY25"/>
-              </a:cxn>
-              <a:cxn ang="0">
-                <a:pos x="connsiteX26" y="connsiteY26"/>
-              </a:cxn>
-              <a:cxn ang="0">
-                <a:pos x="connsiteX27" y="connsiteY27"/>
-              </a:cxn>
-              <a:cxn ang="0">
-                <a:pos x="connsiteX28" y="connsiteY28"/>
-              </a:cxn>
-              <a:cxn ang="0">
-                <a:pos x="connsiteX29" y="connsiteY29"/>
-              </a:cxn>
-              <a:cxn ang="0">
-                <a:pos x="connsiteX30" y="connsiteY30"/>
-              </a:cxn>
-              <a:cxn ang="0">
-                <a:pos x="connsiteX31" y="connsiteY31"/>
-              </a:cxn>
-              <a:cxn ang="0">
-                <a:pos x="connsiteX32" y="connsiteY32"/>
-              </a:cxn>
-              <a:cxn ang="0">
-                <a:pos x="connsiteX33" y="connsiteY33"/>
-              </a:cxn>
-              <a:cxn ang="0">
-                <a:pos x="connsiteX34" y="connsiteY34"/>
-              </a:cxn>
-              <a:cxn ang="0">
-                <a:pos x="connsiteX35" y="connsiteY35"/>
-              </a:cxn>
-            </a:cxnLst>
-            <a:rect l="l" t="t" r="r" b="b"/>
-            <a:pathLst>
-              <a:path w="559472" h="3709642">
-                <a:moveTo>
-                  <a:pt x="0" y="0"/>
-                </a:moveTo>
-                <a:lnTo>
-                  <a:pt x="473952" y="0"/>
-                </a:lnTo>
-                <a:lnTo>
-                  <a:pt x="485840" y="161194"/>
-                </a:lnTo>
-                <a:cubicBezTo>
-                  <a:pt x="552063" y="1147770"/>
-                  <a:pt x="592441" y="3086737"/>
-                  <a:pt x="523949" y="3672197"/>
-                </a:cubicBezTo>
-                <a:cubicBezTo>
-                  <a:pt x="500842" y="3684557"/>
-                  <a:pt x="477855" y="3697282"/>
-                  <a:pt x="454748" y="3709642"/>
-                </a:cubicBezTo>
-                <a:lnTo>
-                  <a:pt x="448224" y="3510471"/>
-                </a:lnTo>
-                <a:lnTo>
-                  <a:pt x="443564" y="3408563"/>
-                </a:lnTo>
-                <a:lnTo>
-                  <a:pt x="438902" y="3304407"/>
-                </a:lnTo>
-                <a:lnTo>
-                  <a:pt x="433941" y="3198777"/>
-                </a:lnTo>
-                <a:lnTo>
-                  <a:pt x="427584" y="3092510"/>
-                </a:lnTo>
-                <a:lnTo>
-                  <a:pt x="420988" y="2984390"/>
-                </a:lnTo>
-                <a:lnTo>
-                  <a:pt x="414330" y="2874401"/>
-                </a:lnTo>
-                <a:lnTo>
-                  <a:pt x="406840" y="2762980"/>
-                </a:lnTo>
-                <a:lnTo>
-                  <a:pt x="397745" y="2650566"/>
-                </a:lnTo>
-                <a:lnTo>
-                  <a:pt x="389154" y="2536612"/>
-                </a:lnTo>
-                <a:lnTo>
-                  <a:pt x="379225" y="2421642"/>
-                </a:lnTo>
-                <a:lnTo>
-                  <a:pt x="368316" y="2305627"/>
-                </a:lnTo>
-                <a:lnTo>
-                  <a:pt x="357466" y="2189233"/>
-                </a:lnTo>
-                <a:lnTo>
-                  <a:pt x="344982" y="2071473"/>
-                </a:lnTo>
-                <a:lnTo>
-                  <a:pt x="332466" y="1952216"/>
-                </a:lnTo>
-                <a:lnTo>
-                  <a:pt x="319121" y="1833776"/>
-                </a:lnTo>
-                <a:lnTo>
-                  <a:pt x="304408" y="1713948"/>
-                </a:lnTo>
-                <a:lnTo>
-                  <a:pt x="288685" y="1592703"/>
-                </a:lnTo>
-                <a:lnTo>
-                  <a:pt x="273050" y="1471451"/>
-                </a:lnTo>
-                <a:lnTo>
-                  <a:pt x="255813" y="1350328"/>
-                </a:lnTo>
-                <a:lnTo>
-                  <a:pt x="237060" y="1227080"/>
-                </a:lnTo>
-                <a:lnTo>
-                  <a:pt x="218488" y="1106065"/>
-                </a:lnTo>
-                <a:lnTo>
-                  <a:pt x="198221" y="982940"/>
-                </a:lnTo>
-                <a:lnTo>
-                  <a:pt x="177152" y="858755"/>
-                </a:lnTo>
-                <a:lnTo>
-                  <a:pt x="155551" y="736861"/>
-                </a:lnTo>
-                <a:lnTo>
-                  <a:pt x="131782" y="613645"/>
-                </a:lnTo>
-                <a:lnTo>
-                  <a:pt x="107123" y="490500"/>
-                </a:lnTo>
-                <a:lnTo>
-                  <a:pt x="82552" y="367348"/>
-                </a:lnTo>
-                <a:lnTo>
-                  <a:pt x="55608" y="244762"/>
-                </a:lnTo>
-                <a:lnTo>
-                  <a:pt x="28130" y="122220"/>
-                </a:lnTo>
-                <a:lnTo>
-                  <a:pt x="0" y="0"/>
-                </a:lnTo>
-                <a:close/>
-              </a:path>
-            </a:pathLst>
-          </a:custGeom>
-          <a:solidFill>
-            <a:schemeClr val="tx1">
-              <a:alpha val="20000"/>
-            </a:schemeClr>
-          </a:solidFill>
-          <a:ln>
-            <a:noFill/>
-          </a:ln>
-        </p:spPr>
-        <p:txBody>
-          <a:bodyPr rtlCol="0" anchor="ctr"/>
-          <a:lstStyle/>
-          <a:p>
-            <a:pPr marL="0" marR="0" lvl="0" indent="0" algn="ctr" defTabSz="914400" rtl="0" eaLnBrk="1" fontAlgn="auto" latinLnBrk="0" hangingPunct="1">
-              <a:lnSpc>
-                <a:spcPct val="100000"/>
-              </a:lnSpc>
-              <a:spcBef>
-                <a:spcPts val="0"/>
-              </a:spcBef>
-              <a:spcAft>
-                <a:spcPts val="0"/>
-              </a:spcAft>
-              <a:buClrTx/>
-              <a:buSzTx/>
-              <a:buFontTx/>
-              <a:buNone/>
-              <a:tabLst/>
-              <a:defRPr/>
-            </a:pPr>
-            <a:endParaRPr kumimoji="0" lang="en-US" sz="1800" b="0" i="0" u="none" strike="noStrike" kern="1200" cap="none" spc="0" normalizeH="0" baseline="0" noProof="0">
-              <a:ln>
-                <a:noFill/>
-              </a:ln>
-              <a:solidFill>
-                <a:prstClr val="white"/>
-              </a:solidFill>
-              <a:effectLst/>
-              <a:uLnTx/>
-              <a:uFillTx/>
-              <a:latin typeface="Century Gothic" panose="020B0502020202020204"/>
-              <a:ea typeface="+mn-ea"/>
-              <a:cs typeface="+mn-cs"/>
-            </a:endParaRPr>
-          </a:p>
-        </p:txBody>
-      </p:sp>
-      <p:pic>
-        <p:nvPicPr>
-          <p:cNvPr id="7" name="Immagine 6" descr="Immagine che contiene musica, Strumento musicale, chitarra, persona&#10;&#10;Descrizione generata automaticamente">
-            <a:extLst>
-              <a:ext uri="{FF2B5EF4-FFF2-40B4-BE49-F238E27FC236}">
-                <a16:creationId xmlns:a16="http://schemas.microsoft.com/office/drawing/2014/main" id="{2DEC5DF2-251F-32F3-FCE3-584EA11801DD}"/>
-              </a:ext>
-            </a:extLst>
-          </p:cNvPr>
-          <p:cNvPicPr>
-            <a:picLocks noChangeAspect="1"/>
-          </p:cNvPicPr>
-          <p:nvPr/>
-        </p:nvPicPr>
-        <p:blipFill rotWithShape="1">
-          <a:blip r:embed="rId4">
-            <a:extLst>
-              <a:ext uri="{28A0092B-C50C-407E-A947-70E740481C1C}">
-                <a14:useLocalDpi xmlns:a14="http://schemas.microsoft.com/office/drawing/2010/main" val="0"/>
-              </a:ext>
-            </a:extLst>
-          </a:blip>
-          <a:srcRect t="22661" r="2" b="20401"/>
-          <a:stretch/>
-        </p:blipFill>
-        <p:spPr>
-          <a:xfrm>
-            <a:off x="7220078" y="10"/>
-            <a:ext cx="4971922" cy="2285990"/>
-          </a:xfrm>
-          <a:custGeom>
-            <a:avLst/>
-            <a:gdLst/>
-            <a:ahLst/>
-            <a:cxnLst/>
-            <a:rect l="l" t="t" r="r" b="b"/>
-            <a:pathLst>
-              <a:path w="4971922" h="2286000">
-                <a:moveTo>
-                  <a:pt x="0" y="0"/>
-                </a:moveTo>
-                <a:lnTo>
-                  <a:pt x="1343538" y="0"/>
-                </a:lnTo>
-                <a:lnTo>
-                  <a:pt x="1343538" y="1"/>
-                </a:lnTo>
-                <a:lnTo>
-                  <a:pt x="4971922" y="1"/>
-                </a:lnTo>
-                <a:lnTo>
-                  <a:pt x="4971922" y="2286000"/>
-                </a:lnTo>
-                <a:lnTo>
-                  <a:pt x="232518" y="2286000"/>
-                </a:lnTo>
-                <a:lnTo>
-                  <a:pt x="227089" y="2167128"/>
-                </a:lnTo>
-                <a:lnTo>
-                  <a:pt x="218852" y="2014881"/>
-                </a:lnTo>
-                <a:lnTo>
-                  <a:pt x="210952" y="1861947"/>
-                </a:lnTo>
-                <a:lnTo>
-                  <a:pt x="200867" y="1709014"/>
-                </a:lnTo>
-                <a:lnTo>
-                  <a:pt x="188764" y="1554023"/>
-                </a:lnTo>
-                <a:lnTo>
-                  <a:pt x="176662" y="1401090"/>
-                </a:lnTo>
-                <a:lnTo>
-                  <a:pt x="162710" y="1245413"/>
-                </a:lnTo>
-                <a:lnTo>
-                  <a:pt x="147414" y="1089051"/>
-                </a:lnTo>
-                <a:lnTo>
-                  <a:pt x="131278" y="934746"/>
-                </a:lnTo>
-                <a:lnTo>
-                  <a:pt x="112452" y="778383"/>
-                </a:lnTo>
-                <a:lnTo>
-                  <a:pt x="92281" y="622707"/>
-                </a:lnTo>
-                <a:lnTo>
-                  <a:pt x="72278" y="466344"/>
-                </a:lnTo>
-                <a:lnTo>
-                  <a:pt x="48914" y="310668"/>
-                </a:lnTo>
-                <a:lnTo>
-                  <a:pt x="25045" y="155677"/>
-                </a:lnTo>
-                <a:close/>
-              </a:path>
-            </a:pathLst>
-          </a:custGeom>
-        </p:spPr>
-      </p:pic>
-      <p:sp>
-        <p:nvSpPr>
-          <p:cNvPr id="3" name="Segnaposto contenuto 2">
-            <a:extLst>
-              <a:ext uri="{FF2B5EF4-FFF2-40B4-BE49-F238E27FC236}">
-                <a16:creationId xmlns:a16="http://schemas.microsoft.com/office/drawing/2014/main" id="{C9198737-DD02-151D-6D99-55011682B3C7}"/>
-              </a:ext>
-            </a:extLst>
-          </p:cNvPr>
-          <p:cNvSpPr>
-            <a:spLocks noGrp="1"/>
-          </p:cNvSpPr>
-          <p:nvPr>
-            <p:ph idx="1"/>
-          </p:nvPr>
-        </p:nvSpPr>
-        <p:spPr>
-          <a:xfrm>
-            <a:off x="648930" y="2438400"/>
-            <a:ext cx="6188189" cy="3785419"/>
-          </a:xfrm>
-        </p:spPr>
-        <p:txBody>
-          <a:bodyPr>
-            <a:normAutofit lnSpcReduction="10000"/>
-          </a:bodyPr>
-          <a:lstStyle/>
-          <a:p>
-            <a:pPr>
-              <a:lnSpc>
-                <a:spcPct val="90000"/>
-              </a:lnSpc>
-            </a:pPr>
-            <a:r>
-              <a:rPr lang="it-IT" sz="1800" dirty="0">
-                <a:solidFill>
-                  <a:srgbClr val="FFFFFF"/>
-                </a:solidFill>
-              </a:rPr>
-              <a:t>Fingers can </a:t>
-            </a:r>
-            <a:r>
-              <a:rPr lang="it-IT" sz="1800" b="1" dirty="0" err="1">
-                <a:solidFill>
-                  <a:srgbClr val="FFFFFF"/>
-                </a:solidFill>
-              </a:rPr>
-              <a:t>not</a:t>
-            </a:r>
-            <a:r>
-              <a:rPr lang="it-IT" sz="1800" b="1" dirty="0">
-                <a:solidFill>
-                  <a:srgbClr val="FFFFFF"/>
-                </a:solidFill>
-              </a:rPr>
-              <a:t> cross</a:t>
-            </a:r>
-          </a:p>
-          <a:p>
-            <a:pPr>
-              <a:lnSpc>
-                <a:spcPct val="90000"/>
-              </a:lnSpc>
-            </a:pPr>
-            <a:endParaRPr lang="it-IT" sz="1800" dirty="0">
-              <a:solidFill>
-                <a:srgbClr val="FFFFFF"/>
-              </a:solidFill>
-            </a:endParaRPr>
-          </a:p>
-          <a:p>
-            <a:pPr>
-              <a:lnSpc>
-                <a:spcPct val="90000"/>
-              </a:lnSpc>
-            </a:pPr>
-            <a:r>
-              <a:rPr lang="it-IT" sz="1800" b="1" dirty="0">
-                <a:solidFill>
-                  <a:srgbClr val="FFFFFF"/>
-                </a:solidFill>
-              </a:rPr>
-              <a:t>Left-</a:t>
-            </a:r>
-            <a:r>
-              <a:rPr lang="it-IT" sz="1800" b="1" dirty="0" err="1">
-                <a:solidFill>
-                  <a:srgbClr val="FFFFFF"/>
-                </a:solidFill>
-              </a:rPr>
-              <a:t>most</a:t>
-            </a:r>
-            <a:r>
-              <a:rPr lang="it-IT" sz="1800" b="1" dirty="0">
-                <a:solidFill>
-                  <a:srgbClr val="FFFFFF"/>
-                </a:solidFill>
-              </a:rPr>
-              <a:t> </a:t>
-            </a:r>
-            <a:r>
-              <a:rPr lang="it-IT" sz="1800" b="1" dirty="0" err="1">
-                <a:solidFill>
-                  <a:srgbClr val="FFFFFF"/>
-                </a:solidFill>
-              </a:rPr>
-              <a:t>fret</a:t>
-            </a:r>
-            <a:r>
-              <a:rPr lang="it-IT" sz="1800" b="1" dirty="0">
-                <a:solidFill>
-                  <a:srgbClr val="FFFFFF"/>
-                </a:solidFill>
-              </a:rPr>
-              <a:t> </a:t>
-            </a:r>
-            <a:r>
-              <a:rPr lang="it-IT" sz="1800" dirty="0" err="1">
-                <a:solidFill>
-                  <a:srgbClr val="FFFFFF"/>
-                </a:solidFill>
-              </a:rPr>
-              <a:t>will</a:t>
-            </a:r>
-            <a:r>
-              <a:rPr lang="it-IT" sz="1800" dirty="0">
-                <a:solidFill>
-                  <a:srgbClr val="FFFFFF"/>
-                </a:solidFill>
-              </a:rPr>
-              <a:t> </a:t>
-            </a:r>
-            <a:r>
-              <a:rPr lang="it-IT" sz="1800" dirty="0" err="1">
-                <a:solidFill>
-                  <a:srgbClr val="FFFFFF"/>
-                </a:solidFill>
-              </a:rPr>
-              <a:t>always</a:t>
-            </a:r>
-            <a:r>
-              <a:rPr lang="it-IT" sz="1800" dirty="0">
-                <a:solidFill>
-                  <a:srgbClr val="FFFFFF"/>
-                </a:solidFill>
-              </a:rPr>
-              <a:t> be </a:t>
-            </a:r>
-            <a:r>
-              <a:rPr lang="it-IT" sz="1800" dirty="0" err="1">
-                <a:solidFill>
-                  <a:srgbClr val="FFFFFF"/>
-                </a:solidFill>
-              </a:rPr>
-              <a:t>assigned</a:t>
-            </a:r>
-            <a:r>
-              <a:rPr lang="it-IT" sz="1800" dirty="0">
-                <a:solidFill>
-                  <a:srgbClr val="FFFFFF"/>
-                </a:solidFill>
-              </a:rPr>
-              <a:t> to the </a:t>
-            </a:r>
-            <a:r>
-              <a:rPr lang="it-IT" sz="1800" b="1" dirty="0">
-                <a:solidFill>
-                  <a:srgbClr val="FFFFFF"/>
-                </a:solidFill>
-              </a:rPr>
-              <a:t>index finger </a:t>
-            </a:r>
-            <a:r>
-              <a:rPr lang="it-IT" sz="1800" dirty="0">
-                <a:solidFill>
-                  <a:srgbClr val="FFFFFF"/>
-                </a:solidFill>
-              </a:rPr>
-              <a:t>(</a:t>
-            </a:r>
-            <a:r>
-              <a:rPr lang="it-IT" sz="1800" dirty="0" err="1">
-                <a:solidFill>
-                  <a:srgbClr val="FFFFFF"/>
-                </a:solidFill>
-              </a:rPr>
-              <a:t>always</a:t>
-            </a:r>
-            <a:r>
-              <a:rPr lang="it-IT" sz="1800" dirty="0">
-                <a:solidFill>
-                  <a:srgbClr val="FFFFFF"/>
-                </a:solidFill>
-              </a:rPr>
-              <a:t> </a:t>
-            </a:r>
-            <a:r>
-              <a:rPr lang="it-IT" sz="1800" dirty="0" err="1">
-                <a:solidFill>
-                  <a:srgbClr val="FFFFFF"/>
-                </a:solidFill>
-              </a:rPr>
-              <a:t>possible</a:t>
-            </a:r>
-            <a:r>
-              <a:rPr lang="it-IT" sz="1800" dirty="0">
-                <a:solidFill>
-                  <a:srgbClr val="FFFFFF"/>
-                </a:solidFill>
-              </a:rPr>
-              <a:t> to </a:t>
-            </a:r>
-            <a:r>
-              <a:rPr lang="it-IT" sz="1800" dirty="0" err="1">
-                <a:solidFill>
-                  <a:srgbClr val="FFFFFF"/>
-                </a:solidFill>
-              </a:rPr>
-              <a:t>find</a:t>
-            </a:r>
-            <a:r>
-              <a:rPr lang="it-IT" sz="1800" dirty="0">
-                <a:solidFill>
-                  <a:srgbClr val="FFFFFF"/>
-                </a:solidFill>
-              </a:rPr>
-              <a:t> a </a:t>
-            </a:r>
-            <a:r>
-              <a:rPr lang="it-IT" sz="1800" dirty="0" err="1">
-                <a:solidFill>
-                  <a:srgbClr val="FFFFFF"/>
-                </a:solidFill>
-              </a:rPr>
-              <a:t>voicing</a:t>
-            </a:r>
-            <a:r>
-              <a:rPr lang="it-IT" sz="1800" dirty="0">
-                <a:solidFill>
-                  <a:srgbClr val="FFFFFF"/>
-                </a:solidFill>
-              </a:rPr>
-              <a:t>)</a:t>
-            </a:r>
-          </a:p>
-          <a:p>
-            <a:pPr>
-              <a:lnSpc>
-                <a:spcPct val="90000"/>
-              </a:lnSpc>
-            </a:pPr>
-            <a:endParaRPr lang="it-IT" sz="1800" dirty="0">
-              <a:solidFill>
-                <a:srgbClr val="FFFFFF"/>
-              </a:solidFill>
-            </a:endParaRPr>
-          </a:p>
-          <a:p>
-            <a:pPr>
-              <a:lnSpc>
-                <a:spcPct val="90000"/>
-              </a:lnSpc>
-            </a:pPr>
-            <a:r>
-              <a:rPr lang="it-IT" sz="1800" dirty="0" err="1">
-                <a:solidFill>
-                  <a:srgbClr val="FFFFFF"/>
-                </a:solidFill>
-              </a:rPr>
-              <a:t>Adjacent</a:t>
-            </a:r>
-            <a:r>
-              <a:rPr lang="it-IT" sz="1800" dirty="0">
-                <a:solidFill>
-                  <a:srgbClr val="FFFFFF"/>
-                </a:solidFill>
-              </a:rPr>
-              <a:t> fingers must press </a:t>
-            </a:r>
-            <a:r>
-              <a:rPr lang="it-IT" sz="1800" dirty="0" err="1">
-                <a:solidFill>
-                  <a:srgbClr val="FFFFFF"/>
-                </a:solidFill>
-              </a:rPr>
-              <a:t>adjacent</a:t>
-            </a:r>
-            <a:r>
-              <a:rPr lang="it-IT" sz="1800" dirty="0">
-                <a:solidFill>
-                  <a:srgbClr val="FFFFFF"/>
-                </a:solidFill>
-              </a:rPr>
-              <a:t> </a:t>
-            </a:r>
-            <a:r>
-              <a:rPr lang="it-IT" sz="1800" dirty="0" err="1">
-                <a:solidFill>
-                  <a:srgbClr val="FFFFFF"/>
-                </a:solidFill>
-              </a:rPr>
-              <a:t>frets</a:t>
-            </a:r>
-            <a:r>
-              <a:rPr lang="it-IT" sz="1800" dirty="0">
-                <a:solidFill>
-                  <a:srgbClr val="FFFFFF"/>
-                </a:solidFill>
-              </a:rPr>
-              <a:t> (+1 stretch </a:t>
-            </a:r>
-            <a:r>
-              <a:rPr lang="it-IT" sz="1800" dirty="0" err="1">
-                <a:solidFill>
-                  <a:srgbClr val="FFFFFF"/>
-                </a:solidFill>
-              </a:rPr>
-              <a:t>allowed</a:t>
-            </a:r>
-            <a:r>
-              <a:rPr lang="it-IT" sz="1800" dirty="0">
-                <a:solidFill>
-                  <a:srgbClr val="FFFFFF"/>
-                </a:solidFill>
-              </a:rPr>
-              <a:t> in </a:t>
-            </a:r>
-            <a:r>
-              <a:rPr lang="it-IT" sz="1800" dirty="0" err="1">
-                <a:solidFill>
-                  <a:srgbClr val="FFFFFF"/>
-                </a:solidFill>
-              </a:rPr>
-              <a:t>difficult</a:t>
-            </a:r>
-            <a:r>
-              <a:rPr lang="it-IT" sz="1800" dirty="0">
-                <a:solidFill>
-                  <a:srgbClr val="FFFFFF"/>
-                </a:solidFill>
-              </a:rPr>
-              <a:t> mode)</a:t>
-            </a:r>
-          </a:p>
-          <a:p>
-            <a:pPr>
-              <a:lnSpc>
-                <a:spcPct val="90000"/>
-              </a:lnSpc>
-            </a:pPr>
-            <a:endParaRPr lang="it-IT" sz="1800" dirty="0">
-              <a:solidFill>
-                <a:srgbClr val="FFFFFF"/>
-              </a:solidFill>
-            </a:endParaRPr>
-          </a:p>
-          <a:p>
-            <a:pPr>
-              <a:lnSpc>
-                <a:spcPct val="90000"/>
-              </a:lnSpc>
-            </a:pPr>
-            <a:r>
-              <a:rPr lang="it-IT" sz="1800" dirty="0">
-                <a:solidFill>
-                  <a:srgbClr val="FFFFFF"/>
-                </a:solidFill>
-              </a:rPr>
-              <a:t>Maximum </a:t>
-            </a:r>
-            <a:r>
-              <a:rPr lang="it-IT" sz="1800" dirty="0" err="1">
-                <a:solidFill>
-                  <a:srgbClr val="FFFFFF"/>
-                </a:solidFill>
-              </a:rPr>
-              <a:t>chord</a:t>
-            </a:r>
-            <a:r>
-              <a:rPr lang="it-IT" sz="1800" dirty="0">
-                <a:solidFill>
-                  <a:srgbClr val="FFFFFF"/>
-                </a:solidFill>
-              </a:rPr>
-              <a:t> </a:t>
-            </a:r>
-            <a:r>
-              <a:rPr lang="it-IT" sz="1800" b="1" dirty="0" err="1">
-                <a:solidFill>
-                  <a:srgbClr val="FFFFFF"/>
-                </a:solidFill>
-              </a:rPr>
-              <a:t>width</a:t>
-            </a:r>
-            <a:r>
-              <a:rPr lang="it-IT" sz="1800" dirty="0">
-                <a:solidFill>
-                  <a:srgbClr val="FFFFFF"/>
-                </a:solidFill>
-              </a:rPr>
-              <a:t> must </a:t>
-            </a:r>
-            <a:r>
-              <a:rPr lang="it-IT" sz="1800" dirty="0" err="1">
-                <a:solidFill>
-                  <a:srgbClr val="FFFFFF"/>
-                </a:solidFill>
-              </a:rPr>
-              <a:t>not</a:t>
-            </a:r>
-            <a:r>
-              <a:rPr lang="it-IT" sz="1800" dirty="0">
-                <a:solidFill>
-                  <a:srgbClr val="FFFFFF"/>
-                </a:solidFill>
-              </a:rPr>
-              <a:t> </a:t>
-            </a:r>
-            <a:r>
-              <a:rPr lang="it-IT" sz="1800" dirty="0" err="1">
-                <a:solidFill>
-                  <a:srgbClr val="FFFFFF"/>
-                </a:solidFill>
-              </a:rPr>
-              <a:t>exceed</a:t>
-            </a:r>
-            <a:r>
-              <a:rPr lang="it-IT" sz="1800" dirty="0">
-                <a:solidFill>
-                  <a:srgbClr val="FFFFFF"/>
-                </a:solidFill>
-              </a:rPr>
-              <a:t> </a:t>
-            </a:r>
-            <a:r>
-              <a:rPr lang="it-IT" sz="1800" b="1" dirty="0">
-                <a:solidFill>
-                  <a:srgbClr val="FFFFFF"/>
-                </a:solidFill>
-              </a:rPr>
-              <a:t>4 </a:t>
-            </a:r>
-            <a:r>
-              <a:rPr lang="it-IT" sz="1800" b="1" dirty="0" err="1">
-                <a:solidFill>
-                  <a:srgbClr val="FFFFFF"/>
-                </a:solidFill>
-              </a:rPr>
-              <a:t>frets</a:t>
-            </a:r>
-            <a:r>
-              <a:rPr lang="it-IT" sz="1800" b="1" dirty="0">
-                <a:solidFill>
-                  <a:srgbClr val="FFFFFF"/>
-                </a:solidFill>
-              </a:rPr>
-              <a:t> </a:t>
-            </a:r>
-            <a:r>
-              <a:rPr lang="it-IT" sz="1800" dirty="0">
-                <a:solidFill>
-                  <a:srgbClr val="FFFFFF"/>
-                </a:solidFill>
-              </a:rPr>
-              <a:t>(5 in </a:t>
-            </a:r>
-            <a:r>
-              <a:rPr lang="it-IT" sz="1800" dirty="0" err="1">
-                <a:solidFill>
-                  <a:srgbClr val="FFFFFF"/>
-                </a:solidFill>
-              </a:rPr>
-              <a:t>difficult</a:t>
-            </a:r>
-            <a:r>
-              <a:rPr lang="it-IT" sz="1800" dirty="0">
-                <a:solidFill>
-                  <a:srgbClr val="FFFFFF"/>
-                </a:solidFill>
-              </a:rPr>
-              <a:t> mode)</a:t>
-            </a:r>
-          </a:p>
-          <a:p>
-            <a:pPr>
-              <a:lnSpc>
-                <a:spcPct val="90000"/>
-              </a:lnSpc>
-            </a:pPr>
-            <a:endParaRPr lang="it-IT" sz="1800" dirty="0">
-              <a:solidFill>
-                <a:srgbClr val="FFFFFF"/>
-              </a:solidFill>
-            </a:endParaRPr>
-          </a:p>
-          <a:p>
-            <a:pPr>
-              <a:lnSpc>
-                <a:spcPct val="90000"/>
-              </a:lnSpc>
-            </a:pPr>
-            <a:r>
-              <a:rPr lang="it-IT" sz="1800" dirty="0">
-                <a:solidFill>
-                  <a:srgbClr val="FFFFFF"/>
-                </a:solidFill>
-              </a:rPr>
-              <a:t>Check </a:t>
-            </a:r>
-            <a:r>
-              <a:rPr lang="it-IT" sz="1800" dirty="0" err="1">
-                <a:solidFill>
-                  <a:srgbClr val="FFFFFF"/>
-                </a:solidFill>
-              </a:rPr>
-              <a:t>if</a:t>
-            </a:r>
-            <a:r>
-              <a:rPr lang="it-IT" sz="1800" dirty="0">
-                <a:solidFill>
-                  <a:srgbClr val="FFFFFF"/>
-                </a:solidFill>
-              </a:rPr>
-              <a:t> </a:t>
-            </a:r>
-            <a:r>
-              <a:rPr lang="it-IT" sz="1800" b="1" dirty="0">
-                <a:solidFill>
-                  <a:srgbClr val="FFFFFF"/>
-                </a:solidFill>
-              </a:rPr>
-              <a:t>barre</a:t>
-            </a:r>
-            <a:r>
-              <a:rPr lang="it-IT" sz="1800" dirty="0">
-                <a:solidFill>
-                  <a:srgbClr val="FFFFFF"/>
-                </a:solidFill>
-              </a:rPr>
-              <a:t> can be </a:t>
-            </a:r>
-            <a:r>
-              <a:rPr lang="it-IT" sz="1800" dirty="0" err="1">
-                <a:solidFill>
-                  <a:srgbClr val="FFFFFF"/>
-                </a:solidFill>
-              </a:rPr>
-              <a:t>used</a:t>
-            </a:r>
-            <a:endParaRPr lang="it-IT" sz="1800" dirty="0">
-              <a:solidFill>
-                <a:srgbClr val="FFFFFF"/>
-              </a:solidFill>
-            </a:endParaRPr>
-          </a:p>
-          <a:p>
-            <a:pPr>
-              <a:lnSpc>
-                <a:spcPct val="90000"/>
-              </a:lnSpc>
-            </a:pPr>
-            <a:endParaRPr lang="it-IT" sz="1800" dirty="0">
-              <a:solidFill>
-                <a:srgbClr val="FFFFFF"/>
-              </a:solidFill>
-            </a:endParaRPr>
-          </a:p>
-        </p:txBody>
-      </p:sp>
-      <p:pic>
-        <p:nvPicPr>
-          <p:cNvPr id="1028" name="Picture 4">
-            <a:extLst>
-              <a:ext uri="{FF2B5EF4-FFF2-40B4-BE49-F238E27FC236}">
-                <a16:creationId xmlns:a16="http://schemas.microsoft.com/office/drawing/2014/main" id="{4B54DAF9-BC56-42F1-6584-67DC6A3F598E}"/>
-              </a:ext>
-            </a:extLst>
-          </p:cNvPr>
-          <p:cNvPicPr>
-            <a:picLocks noChangeAspect="1" noChangeArrowheads="1"/>
-          </p:cNvPicPr>
-          <p:nvPr/>
-        </p:nvPicPr>
-        <p:blipFill rotWithShape="1">
-          <a:blip r:embed="rId5">
-            <a:extLst>
-              <a:ext uri="{28A0092B-C50C-407E-A947-70E740481C1C}">
-                <a14:useLocalDpi xmlns:a14="http://schemas.microsoft.com/office/drawing/2010/main" val="0"/>
-              </a:ext>
-            </a:extLst>
-          </a:blip>
-          <a:srcRect t="25183" r="-2" b="25633"/>
-          <a:stretch/>
-        </p:blipFill>
-        <p:spPr bwMode="auto">
-          <a:xfrm>
-            <a:off x="7437114" y="2286000"/>
-            <a:ext cx="4754886" cy="2286000"/>
-          </a:xfrm>
-          <a:custGeom>
-            <a:avLst/>
-            <a:gdLst/>
-            <a:ahLst/>
-            <a:cxnLst/>
-            <a:rect l="l" t="t" r="r" b="b"/>
-            <a:pathLst>
-              <a:path w="4754886" h="2286000">
-                <a:moveTo>
-                  <a:pt x="15482" y="0"/>
-                </a:moveTo>
-                <a:lnTo>
-                  <a:pt x="4754886" y="0"/>
-                </a:lnTo>
-                <a:lnTo>
-                  <a:pt x="4754886" y="2286000"/>
-                </a:lnTo>
-                <a:lnTo>
-                  <a:pt x="0" y="2286000"/>
-                </a:lnTo>
-                <a:lnTo>
-                  <a:pt x="8036" y="2135352"/>
-                </a:lnTo>
-                <a:lnTo>
-                  <a:pt x="12742" y="2007793"/>
-                </a:lnTo>
-                <a:lnTo>
-                  <a:pt x="17953" y="1877492"/>
-                </a:lnTo>
-                <a:lnTo>
-                  <a:pt x="22827" y="1745133"/>
-                </a:lnTo>
-                <a:lnTo>
-                  <a:pt x="26021" y="1612087"/>
-                </a:lnTo>
-                <a:lnTo>
-                  <a:pt x="28879" y="1476299"/>
-                </a:lnTo>
-                <a:lnTo>
-                  <a:pt x="31904" y="1339139"/>
-                </a:lnTo>
-                <a:lnTo>
-                  <a:pt x="33921" y="1199236"/>
-                </a:lnTo>
-                <a:lnTo>
-                  <a:pt x="33921" y="1057961"/>
-                </a:lnTo>
-                <a:lnTo>
-                  <a:pt x="34930" y="915315"/>
-                </a:lnTo>
-                <a:lnTo>
-                  <a:pt x="33921" y="771297"/>
-                </a:lnTo>
-                <a:lnTo>
-                  <a:pt x="31904" y="625221"/>
-                </a:lnTo>
-                <a:lnTo>
-                  <a:pt x="30055" y="479146"/>
-                </a:lnTo>
-                <a:lnTo>
-                  <a:pt x="26021" y="331013"/>
-                </a:lnTo>
-                <a:lnTo>
-                  <a:pt x="21819" y="181509"/>
-                </a:lnTo>
-                <a:lnTo>
-                  <a:pt x="16944" y="32004"/>
-                </a:lnTo>
-                <a:close/>
-              </a:path>
-            </a:pathLst>
-          </a:custGeom>
-          <a:noFill/>
-          <a:extLst>
-            <a:ext uri="{909E8E84-426E-40DD-AFC4-6F175D3DCCD1}">
-              <a14:hiddenFill xmlns:a14="http://schemas.microsoft.com/office/drawing/2010/main">
-                <a:solidFill>
-                  <a:srgbClr val="FFFFFF"/>
-                </a:solidFill>
-              </a14:hiddenFill>
-            </a:ext>
-          </a:extLst>
-        </p:spPr>
-      </p:pic>
-      <p:pic>
-        <p:nvPicPr>
-          <p:cNvPr id="5" name="Immagine 4" descr="Immagine che contiene Strumento musicale, musica, chitarra, persona&#10;&#10;Descrizione generata automaticamente">
-            <a:extLst>
-              <a:ext uri="{FF2B5EF4-FFF2-40B4-BE49-F238E27FC236}">
-                <a16:creationId xmlns:a16="http://schemas.microsoft.com/office/drawing/2014/main" id="{12D5DE69-53B2-63BF-A569-4ADEACF2BA82}"/>
-              </a:ext>
-            </a:extLst>
-          </p:cNvPr>
-          <p:cNvPicPr>
-            <a:picLocks noChangeAspect="1"/>
-          </p:cNvPicPr>
-          <p:nvPr/>
-        </p:nvPicPr>
-        <p:blipFill rotWithShape="1">
-          <a:blip r:embed="rId6">
-            <a:extLst>
-              <a:ext uri="{28A0092B-C50C-407E-A947-70E740481C1C}">
-                <a14:useLocalDpi xmlns:a14="http://schemas.microsoft.com/office/drawing/2010/main" val="0"/>
-              </a:ext>
-            </a:extLst>
-          </a:blip>
-          <a:srcRect t="15023" r="2" b="9313"/>
-          <a:stretch/>
-        </p:blipFill>
-        <p:spPr>
-          <a:xfrm>
-            <a:off x="7218902" y="4572000"/>
-            <a:ext cx="4973099" cy="2286000"/>
-          </a:xfrm>
-          <a:custGeom>
-            <a:avLst/>
-            <a:gdLst/>
-            <a:ahLst/>
-            <a:cxnLst/>
-            <a:rect l="l" t="t" r="r" b="b"/>
-            <a:pathLst>
-              <a:path w="4973099" h="2286000">
-                <a:moveTo>
-                  <a:pt x="218212" y="0"/>
-                </a:moveTo>
-                <a:lnTo>
-                  <a:pt x="4973099" y="0"/>
-                </a:lnTo>
-                <a:lnTo>
-                  <a:pt x="4973099" y="2286000"/>
-                </a:lnTo>
-                <a:lnTo>
-                  <a:pt x="897889" y="2286000"/>
-                </a:lnTo>
-                <a:lnTo>
-                  <a:pt x="0" y="2286000"/>
-                </a:lnTo>
-                <a:lnTo>
-                  <a:pt x="5883" y="2245538"/>
-                </a:lnTo>
-                <a:lnTo>
-                  <a:pt x="23197" y="2126894"/>
-                </a:lnTo>
-                <a:lnTo>
-                  <a:pt x="35299" y="2040483"/>
-                </a:lnTo>
-                <a:lnTo>
-                  <a:pt x="48074" y="1937613"/>
-                </a:lnTo>
-                <a:lnTo>
-                  <a:pt x="63370" y="1815541"/>
-                </a:lnTo>
-                <a:lnTo>
-                  <a:pt x="79507" y="1680438"/>
-                </a:lnTo>
-                <a:lnTo>
-                  <a:pt x="96484" y="1528191"/>
-                </a:lnTo>
-                <a:lnTo>
-                  <a:pt x="114469" y="1362227"/>
-                </a:lnTo>
-                <a:lnTo>
-                  <a:pt x="132455" y="1181862"/>
-                </a:lnTo>
-                <a:lnTo>
-                  <a:pt x="150776" y="989838"/>
-                </a:lnTo>
-                <a:lnTo>
-                  <a:pt x="167753" y="782726"/>
-                </a:lnTo>
-                <a:lnTo>
-                  <a:pt x="184058" y="566013"/>
-                </a:lnTo>
-                <a:lnTo>
-                  <a:pt x="198850" y="336956"/>
-                </a:lnTo>
-                <a:lnTo>
-                  <a:pt x="212969" y="98298"/>
-                </a:lnTo>
-                <a:close/>
-              </a:path>
-            </a:pathLst>
-          </a:custGeom>
-        </p:spPr>
-      </p:pic>
-    </p:spTree>
-    <p:extLst>
-      <p:ext uri="{BB962C8B-B14F-4D97-AF65-F5344CB8AC3E}">
-        <p14:creationId xmlns:p14="http://schemas.microsoft.com/office/powerpoint/2010/main" val="2899581696"/>
       </p:ext>
     </p:extLst>
   </p:cSld>

</xml_diff>

<commit_message>
Added clear sequence button (updated also readme and presentation)
</commit_message>
<xml_diff>
--- a/TabMaker_compact.pptx
+++ b/TabMaker_compact.pptx
@@ -13594,6 +13594,61 @@
           </a:p>
           <a:p>
             <a:r>
+              <a:rPr lang="it-IT" dirty="0"/>
+              <a:t>The clear </a:t>
+            </a:r>
+            <a:r>
+              <a:rPr lang="it-IT" dirty="0" err="1"/>
+              <a:t>sequence</a:t>
+            </a:r>
+            <a:r>
+              <a:rPr lang="it-IT" dirty="0"/>
+              <a:t> </a:t>
+            </a:r>
+            <a:r>
+              <a:rPr lang="it-IT" dirty="0" err="1"/>
+              <a:t>button</a:t>
+            </a:r>
+            <a:r>
+              <a:rPr lang="it-IT" dirty="0"/>
+              <a:t> </a:t>
+            </a:r>
+            <a:r>
+              <a:rPr lang="it-IT" dirty="0" err="1"/>
+              <a:t>simply</a:t>
+            </a:r>
+            <a:r>
+              <a:rPr lang="it-IT" dirty="0"/>
+              <a:t> </a:t>
+            </a:r>
+            <a:r>
+              <a:rPr lang="it-IT" dirty="0" err="1"/>
+              <a:t>empties</a:t>
+            </a:r>
+            <a:r>
+              <a:rPr lang="it-IT" dirty="0"/>
+              <a:t> the </a:t>
+            </a:r>
+            <a:r>
+              <a:rPr lang="it-IT" dirty="0" err="1"/>
+              <a:t>chord</a:t>
+            </a:r>
+            <a:r>
+              <a:rPr lang="it-IT" dirty="0"/>
+              <a:t> </a:t>
+            </a:r>
+            <a:r>
+              <a:rPr lang="it-IT" dirty="0" err="1"/>
+              <a:t>sequence</a:t>
+            </a:r>
+            <a:r>
+              <a:rPr lang="it-IT"/>
+              <a:t>.</a:t>
+            </a:r>
+            <a:endParaRPr lang="it-IT" dirty="0"/>
+          </a:p>
+          <a:p>
+            <a:r>
               <a:rPr lang="it-IT" dirty="0" err="1"/>
               <a:t>Finally</a:t>
             </a:r>
@@ -32794,7 +32849,7 @@
       </p:grpSpPr>
       <p:sp>
         <p:nvSpPr>
-          <p:cNvPr id="59" name="Rectangle 58">
+          <p:cNvPr id="70" name="Rectangle 69">
             <a:extLst>
               <a:ext uri="{FF2B5EF4-FFF2-40B4-BE49-F238E27FC236}">
                 <a16:creationId xmlns:a16="http://schemas.microsoft.com/office/drawing/2014/main" id="{B4AAD3FD-83A5-4B89-9F8F-01B8870865BE}"/>
@@ -32973,7 +33028,7 @@
       </p:sp>
       <p:sp>
         <p:nvSpPr>
-          <p:cNvPr id="61" name="Freeform 31">
+          <p:cNvPr id="72" name="Freeform 31">
             <a:extLst>
               <a:ext uri="{FF2B5EF4-FFF2-40B4-BE49-F238E27FC236}">
                 <a16:creationId xmlns:a16="http://schemas.microsoft.com/office/drawing/2014/main" id="{61752F1D-FC0F-4103-9584-630E643CCDA6}"/>
@@ -33325,7 +33380,7 @@
       </p:sp>
       <p:sp useBgFill="1">
         <p:nvSpPr>
-          <p:cNvPr id="63" name="Freeform: Shape 62">
+          <p:cNvPr id="74" name="Freeform: Shape 73">
             <a:extLst>
               <a:ext uri="{FF2B5EF4-FFF2-40B4-BE49-F238E27FC236}">
                 <a16:creationId xmlns:a16="http://schemas.microsoft.com/office/drawing/2014/main" id="{70151CB7-E7DE-4917-B831-01DF9CE01306}"/>
@@ -33795,10 +33850,10 @@
       </p:sp>
       <p:pic>
         <p:nvPicPr>
-          <p:cNvPr id="6" name="Picture 5">
+          <p:cNvPr id="3" name="Immagine 2">
             <a:extLst>
               <a:ext uri="{FF2B5EF4-FFF2-40B4-BE49-F238E27FC236}">
-                <a16:creationId xmlns:a16="http://schemas.microsoft.com/office/drawing/2014/main" id="{777A2F08-EBCA-B78D-0B63-F9045710A398}"/>
+                <a16:creationId xmlns:a16="http://schemas.microsoft.com/office/drawing/2014/main" id="{2EC79445-ACD7-1CFE-75F6-C74FCA0578F0}"/>
               </a:ext>
             </a:extLst>
           </p:cNvPr>
@@ -33815,8 +33870,8 @@
         </p:blipFill>
         <p:spPr>
           <a:xfrm>
-            <a:off x="6093992" y="2686452"/>
-            <a:ext cx="5449889" cy="1485093"/>
+            <a:off x="6093992" y="2645577"/>
+            <a:ext cx="5449889" cy="1566843"/>
           </a:xfrm>
           <a:prstGeom prst="rect">
             <a:avLst/>
@@ -33826,7 +33881,7 @@
       </p:pic>
       <p:sp>
         <p:nvSpPr>
-          <p:cNvPr id="65" name="Rectangle 64">
+          <p:cNvPr id="76" name="Rectangle 75">
             <a:extLst>
               <a:ext uri="{FF2B5EF4-FFF2-40B4-BE49-F238E27FC236}">
                 <a16:creationId xmlns:a16="http://schemas.microsoft.com/office/drawing/2014/main" id="{A92A1116-1C84-41DF-B803-1F7B0883EC82}"/>
@@ -33900,7 +33955,7 @@
         </p:nvSpPr>
         <p:spPr>
           <a:xfrm>
-            <a:off x="720911" y="1669447"/>
+            <a:off x="648932" y="1536288"/>
             <a:ext cx="4166509" cy="3785419"/>
           </a:xfrm>
           <a:prstGeom prst="rect">
@@ -34143,10 +34198,9 @@
               <a:lnSpc>
                 <a:spcPct val="90000"/>
               </a:lnSpc>
-              <a:buNone/>
             </a:pPr>
             <a:r>
-              <a:rPr lang="en-US" dirty="0">
+              <a:rPr lang="en-US" sz="1600" dirty="0">
                 <a:solidFill>
                   <a:srgbClr val="EBEBEB"/>
                 </a:solidFill>
@@ -34160,7 +34214,7 @@
                 <a:spcPct val="90000"/>
               </a:lnSpc>
             </a:pPr>
-            <a:endParaRPr lang="en-US" dirty="0">
+            <a:endParaRPr lang="en-US" sz="1600" dirty="0">
               <a:solidFill>
                 <a:srgbClr val="EBEBEB"/>
               </a:solidFill>
@@ -34173,7 +34227,7 @@
               </a:lnSpc>
             </a:pPr>
             <a:r>
-              <a:rPr lang="en-US" dirty="0">
+              <a:rPr lang="en-US" sz="1600" dirty="0">
                 <a:solidFill>
                   <a:srgbClr val="EBEBEB"/>
                 </a:solidFill>
@@ -34188,7 +34242,7 @@
               </a:lnSpc>
             </a:pPr>
             <a:r>
-              <a:rPr lang="en-US" sz="2000" dirty="0">
+              <a:rPr lang="en-US" sz="1600" dirty="0">
                 <a:solidFill>
                   <a:srgbClr val="EBEBEB"/>
                 </a:solidFill>
@@ -34196,23 +34250,23 @@
               <a:t>Specify </a:t>
             </a:r>
             <a:r>
-              <a:rPr lang="en-US" sz="2000" b="1" dirty="0">
+              <a:rPr lang="en-US" sz="1600" b="1" dirty="0">
                 <a:solidFill>
                   <a:srgbClr val="EBEBEB"/>
                 </a:solidFill>
               </a:rPr>
-              <a:t>root </a:t>
-            </a:r>
-            <a:r>
-              <a:rPr lang="en-US" sz="2000" dirty="0">
+              <a:t>root</a:t>
+            </a:r>
+            <a:r>
+              <a:rPr lang="en-US" sz="1600" dirty="0">
                 <a:solidFill>
                   <a:srgbClr val="EBEBEB"/>
                 </a:solidFill>
               </a:rPr>
-              <a:t>and </a:t>
-            </a:r>
-            <a:r>
-              <a:rPr lang="en-US" sz="2000" b="1" dirty="0">
+              <a:t> and </a:t>
+            </a:r>
+            <a:r>
+              <a:rPr lang="en-US" sz="1600" b="1" dirty="0">
                 <a:solidFill>
                   <a:srgbClr val="EBEBEB"/>
                 </a:solidFill>
@@ -34226,7 +34280,7 @@
                 <a:spcPct val="90000"/>
               </a:lnSpc>
             </a:pPr>
-            <a:endParaRPr lang="en-US" dirty="0">
+            <a:endParaRPr lang="en-US" sz="1600" dirty="0">
               <a:solidFill>
                 <a:srgbClr val="EBEBEB"/>
               </a:solidFill>
@@ -34239,7 +34293,7 @@
               </a:lnSpc>
             </a:pPr>
             <a:r>
-              <a:rPr lang="en-US" b="1" dirty="0">
+              <a:rPr lang="en-US" sz="1600" b="1" dirty="0">
                 <a:solidFill>
                   <a:srgbClr val="EBEBEB"/>
                 </a:solidFill>
@@ -34247,7 +34301,7 @@
               <a:t>Submit</a:t>
             </a:r>
             <a:r>
-              <a:rPr lang="en-US" dirty="0">
+              <a:rPr lang="en-US" sz="1600" dirty="0">
                 <a:solidFill>
                   <a:srgbClr val="EBEBEB"/>
                 </a:solidFill>
@@ -34261,7 +34315,7 @@
                 <a:spcPct val="90000"/>
               </a:lnSpc>
             </a:pPr>
-            <a:endParaRPr lang="en-US" dirty="0">
+            <a:endParaRPr lang="en-US" sz="1600" dirty="0">
               <a:solidFill>
                 <a:srgbClr val="EBEBEB"/>
               </a:solidFill>
@@ -34274,7 +34328,7 @@
               </a:lnSpc>
             </a:pPr>
             <a:r>
-              <a:rPr lang="en-US" b="1" dirty="0">
+              <a:rPr lang="en-US" sz="1600" b="1" dirty="0">
                 <a:solidFill>
                   <a:srgbClr val="EBEBEB"/>
                 </a:solidFill>
@@ -34282,7 +34336,7 @@
               <a:t>Options</a:t>
             </a:r>
             <a:r>
-              <a:rPr lang="en-US" dirty="0">
+              <a:rPr lang="en-US" sz="1600" dirty="0">
                 <a:solidFill>
                   <a:srgbClr val="EBEBEB"/>
                 </a:solidFill>
@@ -34296,7 +34350,7 @@
                 <a:spcPct val="90000"/>
               </a:lnSpc>
             </a:pPr>
-            <a:endParaRPr lang="en-US" dirty="0">
+            <a:endParaRPr lang="en-US" sz="1600" dirty="0">
               <a:solidFill>
                 <a:srgbClr val="EBEBEB"/>
               </a:solidFill>
@@ -34309,7 +34363,7 @@
               </a:lnSpc>
             </a:pPr>
             <a:r>
-              <a:rPr lang="en-US" b="1" dirty="0">
+              <a:rPr lang="en-US" sz="1600" b="1" dirty="0">
                 <a:solidFill>
                   <a:srgbClr val="EBEBEB"/>
                 </a:solidFill>
@@ -34317,7 +34371,42 @@
               <a:t>Enable MIDI </a:t>
             </a:r>
             <a:r>
-              <a:rPr lang="en-US" dirty="0">
+              <a:rPr lang="en-US" sz="1600" dirty="0">
+                <a:solidFill>
+                  <a:srgbClr val="EBEBEB"/>
+                </a:solidFill>
+              </a:rPr>
+              <a:t>button</a:t>
+            </a:r>
+          </a:p>
+          <a:p>
+            <a:pPr>
+              <a:lnSpc>
+                <a:spcPct val="90000"/>
+              </a:lnSpc>
+            </a:pPr>
+            <a:endParaRPr lang="en-US" sz="1600" b="1" dirty="0">
+              <a:solidFill>
+                <a:srgbClr val="EBEBEB"/>
+              </a:solidFill>
+            </a:endParaRPr>
+          </a:p>
+          <a:p>
+            <a:pPr>
+              <a:lnSpc>
+                <a:spcPct val="90000"/>
+              </a:lnSpc>
+            </a:pPr>
+            <a:r>
+              <a:rPr lang="en-US" sz="1600" b="1" dirty="0">
+                <a:solidFill>
+                  <a:srgbClr val="EBEBEB"/>
+                </a:solidFill>
+              </a:rPr>
+              <a:t>Clear sequence </a:t>
+            </a:r>
+            <a:r>
+              <a:rPr lang="en-US" sz="1600" dirty="0">
                 <a:solidFill>
                   <a:srgbClr val="EBEBEB"/>
                 </a:solidFill>
@@ -37831,14 +37920,14 @@
               <a:t> component: </a:t>
             </a:r>
             <a:r>
-              <a:rPr lang="it-IT" sz="1400" dirty="0" err="1">
+              <a:rPr lang="it-IT" sz="1400" b="1" dirty="0" err="1">
                 <a:solidFill>
                   <a:srgbClr val="FFFFFF"/>
                 </a:solidFill>
               </a:rPr>
               <a:t>App.vue</a:t>
             </a:r>
-            <a:endParaRPr lang="it-IT" sz="1400" dirty="0">
+            <a:endParaRPr lang="it-IT" sz="1400" b="1" dirty="0">
               <a:solidFill>
                 <a:srgbClr val="FFFFFF"/>
               </a:solidFill>
@@ -37890,12 +37979,72 @@
               <a:t>Input: </a:t>
             </a:r>
             <a:r>
-              <a:rPr lang="it-IT" sz="1400" dirty="0" err="1">
+              <a:rPr lang="it-IT" sz="1400" b="1" dirty="0" err="1">
                 <a:solidFill>
                   <a:srgbClr val="FFFFFF"/>
                 </a:solidFill>
               </a:rPr>
               <a:t>Tuning.vue</a:t>
+            </a:r>
+            <a:r>
+              <a:rPr lang="it-IT" sz="1400" b="1" dirty="0">
+                <a:solidFill>
+                  <a:srgbClr val="FFFFFF"/>
+                </a:solidFill>
+              </a:rPr>
+              <a:t>, </a:t>
+            </a:r>
+            <a:r>
+              <a:rPr lang="it-IT" sz="1400" b="1" dirty="0" err="1">
+                <a:solidFill>
+                  <a:srgbClr val="FFFFFF"/>
+                </a:solidFill>
+              </a:rPr>
+              <a:t>Options.vue</a:t>
+            </a:r>
+            <a:r>
+              <a:rPr lang="it-IT" sz="1400" b="1" dirty="0">
+                <a:solidFill>
+                  <a:srgbClr val="FFFFFF"/>
+                </a:solidFill>
+              </a:rPr>
+              <a:t>, </a:t>
+            </a:r>
+            <a:r>
+              <a:rPr lang="it-IT" sz="1400" b="1" dirty="0" err="1">
+                <a:solidFill>
+                  <a:srgbClr val="FFFFFF"/>
+                </a:solidFill>
+              </a:rPr>
+              <a:t>ToggleButton.vue</a:t>
+            </a:r>
+            <a:endParaRPr lang="it-IT" sz="1400" b="1" dirty="0">
+              <a:solidFill>
+                <a:srgbClr val="FFFFFF"/>
+              </a:solidFill>
+            </a:endParaRPr>
+          </a:p>
+          <a:p>
+            <a:pPr lvl="1">
+              <a:lnSpc>
+                <a:spcPct val="90000"/>
+              </a:lnSpc>
+            </a:pPr>
+            <a:r>
+              <a:rPr lang="it-IT" sz="1400" dirty="0">
+                <a:solidFill>
+                  <a:srgbClr val="FFFFFF"/>
+                </a:solidFill>
+              </a:rPr>
+              <a:t>Output: </a:t>
+            </a:r>
+            <a:r>
+              <a:rPr lang="it-IT" sz="1400" b="1" dirty="0" err="1">
+                <a:solidFill>
+                  <a:srgbClr val="FFFFFF"/>
+                </a:solidFill>
+              </a:rPr>
+              <a:t>Fretboard.vue</a:t>
             </a:r>
             <a:r>
               <a:rPr lang="it-IT" sz="1400" dirty="0">
@@ -37906,74 +38055,14 @@
               <a:t>, </a:t>
             </a:r>
             <a:r>
-              <a:rPr lang="it-IT" sz="1400" dirty="0" err="1">
-                <a:solidFill>
-                  <a:srgbClr val="FFFFFF"/>
-                </a:solidFill>
-              </a:rPr>
-              <a:t>Options.vue</a:t>
-            </a:r>
-            <a:r>
-              <a:rPr lang="it-IT" sz="1400" dirty="0">
-                <a:solidFill>
-                  <a:srgbClr val="FFFFFF"/>
-                </a:solidFill>
-              </a:rPr>
-              <a:t>, </a:t>
-            </a:r>
-            <a:r>
-              <a:rPr lang="it-IT" sz="1400" dirty="0" err="1">
-                <a:solidFill>
-                  <a:srgbClr val="FFFFFF"/>
-                </a:solidFill>
-              </a:rPr>
-              <a:t>ToggleButton.vue</a:t>
-            </a:r>
-            <a:endParaRPr lang="it-IT" sz="1400" dirty="0">
-              <a:solidFill>
-                <a:srgbClr val="FFFFFF"/>
-              </a:solidFill>
-            </a:endParaRPr>
-          </a:p>
-          <a:p>
-            <a:pPr lvl="1">
-              <a:lnSpc>
-                <a:spcPct val="90000"/>
-              </a:lnSpc>
-            </a:pPr>
-            <a:r>
-              <a:rPr lang="it-IT" sz="1400" dirty="0">
-                <a:solidFill>
-                  <a:srgbClr val="FFFFFF"/>
-                </a:solidFill>
-              </a:rPr>
-              <a:t>Output: </a:t>
-            </a:r>
-            <a:r>
-              <a:rPr lang="it-IT" sz="1400" dirty="0" err="1">
-                <a:solidFill>
-                  <a:srgbClr val="FFFFFF"/>
-                </a:solidFill>
-              </a:rPr>
-              <a:t>Fretboard.vue</a:t>
-            </a:r>
-            <a:r>
-              <a:rPr lang="it-IT" sz="1400" dirty="0">
-                <a:solidFill>
-                  <a:srgbClr val="FFFFFF"/>
-                </a:solidFill>
-              </a:rPr>
-              <a:t>, </a:t>
-            </a:r>
-            <a:r>
-              <a:rPr lang="it-IT" sz="1400" dirty="0" err="1">
+              <a:rPr lang="it-IT" sz="1400" b="1" dirty="0" err="1">
                 <a:solidFill>
                   <a:srgbClr val="FFFFFF"/>
                 </a:solidFill>
               </a:rPr>
               <a:t>Tablature.vue</a:t>
             </a:r>
-            <a:endParaRPr lang="it-IT" sz="1400" dirty="0">
+            <a:endParaRPr lang="it-IT" sz="1400" b="1" dirty="0">
               <a:solidFill>
                 <a:srgbClr val="FFFFFF"/>
               </a:solidFill>
@@ -38017,7 +38106,7 @@
               </a:lnSpc>
             </a:pPr>
             <a:r>
-              <a:rPr lang="it-IT" sz="1400" dirty="0">
+              <a:rPr lang="it-IT" sz="1400" b="1" dirty="0">
                 <a:solidFill>
                   <a:srgbClr val="FFFFFF"/>
                 </a:solidFill>
@@ -38032,7 +38121,7 @@
               </a:lnSpc>
             </a:pPr>
             <a:r>
-              <a:rPr lang="it-IT" sz="1400" dirty="0">
+              <a:rPr lang="it-IT" sz="1400" b="1" dirty="0">
                 <a:solidFill>
                   <a:srgbClr val="FFFFFF"/>
                 </a:solidFill>
@@ -38047,7 +38136,7 @@
               </a:lnSpc>
             </a:pPr>
             <a:r>
-              <a:rPr lang="it-IT" sz="1400" dirty="0">
+              <a:rPr lang="it-IT" sz="1400" b="1" dirty="0">
                 <a:solidFill>
                   <a:srgbClr val="FFFFFF"/>
                 </a:solidFill>
@@ -38062,7 +38151,7 @@
               </a:lnSpc>
             </a:pPr>
             <a:r>
-              <a:rPr lang="it-IT" sz="1400" dirty="0">
+              <a:rPr lang="it-IT" sz="1400" b="1" dirty="0">
                 <a:solidFill>
                   <a:srgbClr val="FFFFFF"/>
                 </a:solidFill>
@@ -38077,7 +38166,7 @@
               </a:lnSpc>
             </a:pPr>
             <a:r>
-              <a:rPr lang="it-IT" sz="1400" dirty="0">
+              <a:rPr lang="it-IT" sz="1400" b="1" dirty="0">
                 <a:solidFill>
                   <a:srgbClr val="FFFFFF"/>
                 </a:solidFill>
@@ -38092,7 +38181,7 @@
               </a:lnSpc>
             </a:pPr>
             <a:r>
-              <a:rPr lang="it-IT" sz="1400" dirty="0">
+              <a:rPr lang="it-IT" sz="1400" b="1" dirty="0">
                 <a:solidFill>
                   <a:srgbClr val="FFFFFF"/>
                 </a:solidFill>
@@ -38154,8 +38243,8 @@
         </p:blipFill>
         <p:spPr>
           <a:xfrm>
-            <a:off x="5048451" y="3051735"/>
-            <a:ext cx="6495847" cy="1364128"/>
+            <a:off x="4944295" y="2861443"/>
+            <a:ext cx="6756647" cy="1418896"/>
           </a:xfrm>
           <a:prstGeom prst="rect">
             <a:avLst/>
@@ -38294,6 +38383,38 @@
               <a:rPr lang="it-IT" dirty="0"/>
               <a:t> (note.js)</a:t>
             </a:r>
+          </a:p>
+          <a:p>
+            <a:pPr lvl="1"/>
+            <a:r>
+              <a:rPr lang="it-IT" dirty="0"/>
+              <a:t>Note: pitch class and </a:t>
+            </a:r>
+            <a:r>
+              <a:rPr lang="it-IT" dirty="0" err="1"/>
+              <a:t>octave</a:t>
+            </a:r>
+            <a:endParaRPr lang="it-IT" dirty="0"/>
+          </a:p>
+          <a:p>
+            <a:pPr lvl="1"/>
+            <a:r>
+              <a:rPr lang="it-IT" dirty="0"/>
+              <a:t>Equality supports </a:t>
+            </a:r>
+            <a:r>
+              <a:rPr lang="it-IT" dirty="0" err="1"/>
+              <a:t>enharmonic</a:t>
+            </a:r>
+            <a:r>
+              <a:rPr lang="it-IT" dirty="0"/>
+              <a:t> </a:t>
+            </a:r>
+            <a:r>
+              <a:rPr lang="it-IT" dirty="0" err="1"/>
+              <a:t>representations</a:t>
+            </a:r>
+            <a:endParaRPr lang="it-IT" dirty="0"/>
           </a:p>
           <a:p>
             <a:r>
@@ -39237,7 +39358,23 @@
                   <a:srgbClr val="FFFFFF"/>
                 </a:solidFill>
               </a:rPr>
-              <a:t> finger =&gt; </a:t>
+              <a:t> finger </a:t>
+            </a:r>
+            <a:r>
+              <a:rPr lang="it-IT" sz="2400" i="1" dirty="0">
+                <a:solidFill>
+                  <a:srgbClr val="FFFFFF"/>
+                </a:solidFill>
+              </a:rPr>
+              <a:t>→</a:t>
+            </a:r>
+            <a:r>
+              <a:rPr lang="it-IT" sz="2400" dirty="0">
+                <a:solidFill>
+                  <a:srgbClr val="FFFFFF"/>
+                </a:solidFill>
+              </a:rPr>
+              <a:t> </a:t>
             </a:r>
             <a:r>
               <a:rPr lang="it-IT" sz="2400" b="1" dirty="0">
@@ -39367,7 +39504,7 @@
                   <a:srgbClr val="FFFFFF"/>
                 </a:solidFill>
               </a:rPr>
-              <a:t>-&gt; </a:t>
+              <a:t>→</a:t>
             </a:r>
             <a:r>
               <a:rPr lang="it-IT" sz="1800" i="1" dirty="0">

</xml_diff>

<commit_message>
Added drag feature for chord cards
</commit_message>
<xml_diff>
--- a/TabMaker_compact.pptx
+++ b/TabMaker_compact.pptx
@@ -13642,10 +13642,67 @@
               <a:t>sequence</a:t>
             </a:r>
             <a:r>
-              <a:rPr lang="it-IT"/>
+              <a:rPr lang="it-IT" dirty="0"/>
               <a:t>.</a:t>
             </a:r>
-            <a:endParaRPr lang="it-IT" dirty="0"/>
+          </a:p>
+          <a:p>
+            <a:r>
+              <a:rPr lang="it-IT" dirty="0" err="1"/>
+              <a:t>We</a:t>
+            </a:r>
+            <a:r>
+              <a:rPr lang="it-IT" dirty="0"/>
+              <a:t> can </a:t>
+            </a:r>
+            <a:r>
+              <a:rPr lang="it-IT" dirty="0" err="1"/>
+              <a:t>also</a:t>
+            </a:r>
+            <a:r>
+              <a:rPr lang="it-IT" dirty="0"/>
+              <a:t> click on the </a:t>
+            </a:r>
+            <a:r>
+              <a:rPr lang="it-IT" dirty="0" err="1"/>
+              <a:t>chord</a:t>
+            </a:r>
+            <a:r>
+              <a:rPr lang="it-IT" dirty="0"/>
+              <a:t> cards to </a:t>
+            </a:r>
+            <a:r>
+              <a:rPr lang="it-IT" dirty="0" err="1"/>
+              <a:t>reorder</a:t>
+            </a:r>
+            <a:r>
+              <a:rPr lang="it-IT" dirty="0"/>
+              <a:t> the way </a:t>
+            </a:r>
+            <a:r>
+              <a:rPr lang="it-IT" dirty="0" err="1"/>
+              <a:t>they</a:t>
+            </a:r>
+            <a:r>
+              <a:rPr lang="it-IT" dirty="0"/>
+              <a:t> </a:t>
+            </a:r>
+            <a:r>
+              <a:rPr lang="it-IT" dirty="0" err="1"/>
+              <a:t>appear</a:t>
+            </a:r>
+            <a:r>
+              <a:rPr lang="it-IT" dirty="0"/>
+              <a:t> in the </a:t>
+            </a:r>
+            <a:r>
+              <a:rPr lang="it-IT" dirty="0" err="1"/>
+              <a:t>sequence</a:t>
+            </a:r>
+            <a:r>
+              <a:rPr lang="it-IT" dirty="0"/>
+              <a:t>.</a:t>
+            </a:r>
           </a:p>
           <a:p>
             <a:r>
@@ -33956,7 +34013,7 @@
         <p:spPr>
           <a:xfrm>
             <a:off x="648932" y="1536288"/>
-            <a:ext cx="4166509" cy="3785419"/>
+            <a:ext cx="4166509" cy="4898379"/>
           </a:xfrm>
           <a:prstGeom prst="rect">
             <a:avLst/>
@@ -33964,7 +34021,7 @@
         </p:spPr>
         <p:txBody>
           <a:bodyPr vert="horz" lIns="91440" tIns="45720" rIns="91440" bIns="45720" rtlCol="0">
-            <a:normAutofit fontScale="92500" lnSpcReduction="20000"/>
+            <a:normAutofit lnSpcReduction="10000"/>
           </a:bodyPr>
           <a:lstStyle>
             <a:lvl1pPr marL="342900" indent="-342900" algn="l" defTabSz="457200" rtl="0" eaLnBrk="1" latinLnBrk="0" hangingPunct="1">
@@ -34413,6 +34470,45 @@
               </a:rPr>
               <a:t>button</a:t>
             </a:r>
+          </a:p>
+          <a:p>
+            <a:pPr>
+              <a:lnSpc>
+                <a:spcPct val="90000"/>
+              </a:lnSpc>
+            </a:pPr>
+            <a:endParaRPr lang="en-US" sz="1600" dirty="0">
+              <a:solidFill>
+                <a:srgbClr val="EBEBEB"/>
+              </a:solidFill>
+            </a:endParaRPr>
+          </a:p>
+          <a:p>
+            <a:pPr>
+              <a:lnSpc>
+                <a:spcPct val="90000"/>
+              </a:lnSpc>
+            </a:pPr>
+            <a:r>
+              <a:rPr lang="en-US" sz="1600" dirty="0">
+                <a:solidFill>
+                  <a:srgbClr val="EBEBEB"/>
+                </a:solidFill>
+              </a:rPr>
+              <a:t>Chord cards can be moved around</a:t>
+            </a:r>
+          </a:p>
+          <a:p>
+            <a:pPr>
+              <a:lnSpc>
+                <a:spcPct val="90000"/>
+              </a:lnSpc>
+            </a:pPr>
+            <a:endParaRPr lang="en-US" sz="1600" dirty="0">
+              <a:solidFill>
+                <a:srgbClr val="EBEBEB"/>
+              </a:solidFill>
+            </a:endParaRPr>
           </a:p>
         </p:txBody>
       </p:sp>

</xml_diff>